<commit_message>
Pequeños cambios al powerpoint
</commit_message>
<xml_diff>
--- a/informe/presentacion/AA-01 - Clasificacion_mangos.pptx
+++ b/informe/presentacion/AA-01 - Clasificacion_mangos.pptx
@@ -1711,7 +1711,7 @@
           <a:p>
             <a:fld id="{6EE7A52F-9D89-7442-A8E9-48D1527B5F6B}" type="datetimeFigureOut">
               <a:rPr lang="en-US" smtClean="0"/>
-              <a:t>3/27/2022</a:t>
+              <a:t>3/28/2022</a:t>
             </a:fld>
             <a:endParaRPr lang="en-US" dirty="0"/>
           </a:p>
@@ -7927,8 +7927,8 @@
         </p:blipFill>
         <p:spPr>
           <a:xfrm>
-            <a:off x="759507" y="2425487"/>
-            <a:ext cx="3733800" cy="3433445"/>
+            <a:off x="1404730" y="2226051"/>
+            <a:ext cx="4691270" cy="4313894"/>
           </a:xfrm>
           <a:prstGeom prst="rect">
             <a:avLst/>
@@ -7937,10 +7937,10 @@
       </p:pic>
       <p:graphicFrame>
         <p:nvGraphicFramePr>
-          <p:cNvPr id="2" name="Table 1">
-            <a:extLst>
-              <a:ext uri="{FF2B5EF4-FFF2-40B4-BE49-F238E27FC236}">
-                <a16:creationId xmlns:a16="http://schemas.microsoft.com/office/drawing/2014/main" id="{D28F47BA-6BC9-42B4-9788-812605D79072}"/>
+          <p:cNvPr id="11" name="Table 2">
+            <a:extLst>
+              <a:ext uri="{FF2B5EF4-FFF2-40B4-BE49-F238E27FC236}">
+                <a16:creationId xmlns:a16="http://schemas.microsoft.com/office/drawing/2014/main" id="{FC4EE4CC-F87D-4CB9-AC7C-AD1D5278B657}"/>
               </a:ext>
             </a:extLst>
           </p:cNvPr>
@@ -7950,83 +7950,67 @@
           <p:nvPr>
             <p:extLst>
               <p:ext uri="{D42A27DB-BD31-4B8C-83A1-F6EECF244321}">
-                <p14:modId xmlns:p14="http://schemas.microsoft.com/office/powerpoint/2010/main" val="2547369421"/>
+                <p14:modId xmlns:p14="http://schemas.microsoft.com/office/powerpoint/2010/main" val="2195165533"/>
               </p:ext>
             </p:extLst>
           </p:nvPr>
         </p:nvGraphicFramePr>
         <p:xfrm>
-          <a:off x="5075440" y="3884981"/>
-          <a:ext cx="6589186" cy="365760"/>
+          <a:off x="7210700" y="2870170"/>
+          <a:ext cx="3256999" cy="2194560"/>
         </p:xfrm>
         <a:graphic>
           <a:graphicData uri="http://schemas.openxmlformats.org/drawingml/2006/table">
             <a:tbl>
-              <a:tblPr firstRow="1" firstCol="1" bandRow="1">
-                <a:tableStyleId>{5202B0CA-FC54-4496-8BCA-5EF66A818D29}</a:tableStyleId>
+              <a:tblPr firstRow="1" bandRow="1">
+                <a:tableStyleId>{5C22544A-7EE6-4342-B048-85BDC9FD1C3A}</a:tableStyleId>
               </a:tblPr>
               <a:tblGrid>
-                <a:gridCol w="1130237">
+                <a:gridCol w="1689653">
                   <a:extLst>
                     <a:ext uri="{9D8B030D-6E8A-4147-A177-3AD203B41FA5}">
-                      <a16:colId xmlns:a16="http://schemas.microsoft.com/office/drawing/2014/main" val="2196902818"/>
+                      <a16:colId xmlns:a16="http://schemas.microsoft.com/office/drawing/2014/main" val="2300131777"/>
                     </a:ext>
                   </a:extLst>
                 </a:gridCol>
-                <a:gridCol w="1211740">
+                <a:gridCol w="1567346">
                   <a:extLst>
                     <a:ext uri="{9D8B030D-6E8A-4147-A177-3AD203B41FA5}">
-                      <a16:colId xmlns:a16="http://schemas.microsoft.com/office/drawing/2014/main" val="1132214923"/>
-                    </a:ext>
-                  </a:extLst>
-                </a:gridCol>
-                <a:gridCol w="1021657">
-                  <a:extLst>
-                    <a:ext uri="{9D8B030D-6E8A-4147-A177-3AD203B41FA5}">
-                      <a16:colId xmlns:a16="http://schemas.microsoft.com/office/drawing/2014/main" val="345951469"/>
-                    </a:ext>
-                  </a:extLst>
-                </a:gridCol>
-                <a:gridCol w="1126383">
-                  <a:extLst>
-                    <a:ext uri="{9D8B030D-6E8A-4147-A177-3AD203B41FA5}">
-                      <a16:colId xmlns:a16="http://schemas.microsoft.com/office/drawing/2014/main" val="2792018434"/>
-                    </a:ext>
-                  </a:extLst>
-                </a:gridCol>
-                <a:gridCol w="766025">
-                  <a:extLst>
-                    <a:ext uri="{9D8B030D-6E8A-4147-A177-3AD203B41FA5}">
-                      <a16:colId xmlns:a16="http://schemas.microsoft.com/office/drawing/2014/main" val="2645901736"/>
-                    </a:ext>
-                  </a:extLst>
-                </a:gridCol>
-                <a:gridCol w="1333144">
-                  <a:extLst>
-                    <a:ext uri="{9D8B030D-6E8A-4147-A177-3AD203B41FA5}">
-                      <a16:colId xmlns:a16="http://schemas.microsoft.com/office/drawing/2014/main" val="3538415561"/>
+                      <a16:colId xmlns:a16="http://schemas.microsoft.com/office/drawing/2014/main" val="1477300347"/>
                     </a:ext>
                   </a:extLst>
                 </a:gridCol>
               </a:tblGrid>
-              <a:tr h="0">
+              <a:tr h="360000">
                 <a:tc>
                   <a:txBody>
                     <a:bodyPr/>
                     <a:lstStyle/>
                     <a:p>
-                      <a:pPr algn="ctr">
+                      <a:pPr marL="0" marR="0" lvl="0" indent="0" algn="l" defTabSz="914400" rtl="0" eaLnBrk="1" fontAlgn="auto" latinLnBrk="0" hangingPunct="1">
+                        <a:lnSpc>
+                          <a:spcPct val="100000"/>
+                        </a:lnSpc>
                         <a:spcBef>
-                          <a:spcPts val="600"/>
+                          <a:spcPts val="0"/>
                         </a:spcBef>
+                        <a:spcAft>
+                          <a:spcPts val="0"/>
+                        </a:spcAft>
+                        <a:buClrTx/>
+                        <a:buSzTx/>
+                        <a:buFontTx/>
+                        <a:buNone/>
+                        <a:tabLst/>
+                        <a:defRPr/>
                       </a:pPr>
                       <a:r>
-                        <a:rPr lang="es-ES" sz="1200">
+                        <a:rPr lang="es-ES" sz="1800" dirty="0">
                           <a:effectLst/>
                         </a:rPr>
                         <a:t>Sensibilidad</a:t>
                       </a:r>
-                      <a:endParaRPr lang="es-CO" sz="1200">
+                      <a:endParaRPr lang="es-CO" sz="1800" dirty="0">
                         <a:effectLst/>
                         <a:latin typeface="Calibri" panose="020F0502020204030204" pitchFamily="34" charset="0"/>
                         <a:ea typeface="Calibri" panose="020F0502020204030204" pitchFamily="34" charset="0"/>
@@ -8034,25 +8018,82 @@
                       </a:endParaRPr>
                     </a:p>
                   </a:txBody>
-                  <a:tcPr marL="68580" marR="68580" marT="0" marB="0"/>
+                  <a:tcPr/>
                 </a:tc>
                 <a:tc>
                   <a:txBody>
                     <a:bodyPr/>
                     <a:lstStyle/>
                     <a:p>
-                      <a:pPr algn="ctr">
+                      <a:pPr marL="0" marR="0" lvl="0" indent="0" algn="l" defTabSz="914400" rtl="0" eaLnBrk="1" fontAlgn="auto" latinLnBrk="0" hangingPunct="1">
+                        <a:lnSpc>
+                          <a:spcPct val="100000"/>
+                        </a:lnSpc>
                         <a:spcBef>
-                          <a:spcPts val="600"/>
+                          <a:spcPts val="0"/>
                         </a:spcBef>
+                        <a:spcAft>
+                          <a:spcPts val="0"/>
+                        </a:spcAft>
+                        <a:buClrTx/>
+                        <a:buSzTx/>
+                        <a:buFontTx/>
+                        <a:buNone/>
+                        <a:tabLst/>
+                        <a:defRPr/>
                       </a:pPr>
                       <a:r>
-                        <a:rPr lang="es-ES" sz="1200">
+                        <a:rPr lang="es-ES" sz="1800" b="0" dirty="0">
+                          <a:effectLst/>
+                        </a:rPr>
+                        <a:t>0.982</a:t>
+                      </a:r>
+                      <a:endParaRPr lang="es-CO" sz="1800" b="0" dirty="0">
+                        <a:effectLst/>
+                        <a:latin typeface="Calibri" panose="020F0502020204030204" pitchFamily="34" charset="0"/>
+                        <a:ea typeface="+mn-ea"/>
+                        <a:cs typeface="Times New Roman" panose="02020603050405020304" pitchFamily="18" charset="0"/>
+                      </a:endParaRPr>
+                    </a:p>
+                  </a:txBody>
+                  <a:tcPr/>
+                </a:tc>
+                <a:extLst>
+                  <a:ext uri="{0D108BD9-81ED-4DB2-BD59-A6C34878D82A}">
+                    <a16:rowId xmlns:a16="http://schemas.microsoft.com/office/drawing/2014/main" val="750535927"/>
+                  </a:ext>
+                </a:extLst>
+              </a:tr>
+              <a:tr h="360000">
+                <a:tc>
+                  <a:txBody>
+                    <a:bodyPr/>
+                    <a:lstStyle/>
+                    <a:p>
+                      <a:pPr marL="0" marR="0" lvl="0" indent="0" algn="l" defTabSz="914400" rtl="0" eaLnBrk="1" fontAlgn="auto" latinLnBrk="0" hangingPunct="1">
+                        <a:lnSpc>
+                          <a:spcPct val="100000"/>
+                        </a:lnSpc>
+                        <a:spcBef>
+                          <a:spcPts val="0"/>
+                        </a:spcBef>
+                        <a:spcAft>
+                          <a:spcPts val="0"/>
+                        </a:spcAft>
+                        <a:buClrTx/>
+                        <a:buSzTx/>
+                        <a:buFontTx/>
+                        <a:buNone/>
+                        <a:tabLst/>
+                        <a:defRPr/>
+                      </a:pPr>
+                      <a:r>
+                        <a:rPr lang="es-ES" sz="1800" dirty="0">
                           <a:effectLst/>
                         </a:rPr>
                         <a:t>Precisión</a:t>
                       </a:r>
-                      <a:endParaRPr lang="es-CO" sz="1200">
+                      <a:endParaRPr lang="es-CO" sz="1800" dirty="0">
                         <a:effectLst/>
                         <a:latin typeface="Calibri" panose="020F0502020204030204" pitchFamily="34" charset="0"/>
                         <a:ea typeface="Calibri" panose="020F0502020204030204" pitchFamily="34" charset="0"/>
@@ -8060,25 +8101,37 @@
                       </a:endParaRPr>
                     </a:p>
                   </a:txBody>
-                  <a:tcPr marL="68580" marR="68580" marT="0" marB="0"/>
+                  <a:tcPr/>
                 </a:tc>
                 <a:tc>
                   <a:txBody>
                     <a:bodyPr/>
                     <a:lstStyle/>
                     <a:p>
-                      <a:pPr algn="ctr">
+                      <a:pPr marL="0" marR="0" lvl="0" indent="0" algn="l" defTabSz="914400" rtl="0" eaLnBrk="1" fontAlgn="auto" latinLnBrk="0" hangingPunct="1">
+                        <a:lnSpc>
+                          <a:spcPct val="100000"/>
+                        </a:lnSpc>
                         <a:spcBef>
-                          <a:spcPts val="600"/>
+                          <a:spcPts val="0"/>
                         </a:spcBef>
+                        <a:spcAft>
+                          <a:spcPts val="0"/>
+                        </a:spcAft>
+                        <a:buClrTx/>
+                        <a:buSzTx/>
+                        <a:buFontTx/>
+                        <a:buNone/>
+                        <a:tabLst/>
+                        <a:defRPr/>
                       </a:pPr>
                       <a:r>
-                        <a:rPr lang="es-ES" sz="1200">
+                        <a:rPr lang="es-ES" sz="1800" dirty="0">
                           <a:effectLst/>
                         </a:rPr>
-                        <a:t>F1</a:t>
+                        <a:t>0.982</a:t>
                       </a:r>
-                      <a:endParaRPr lang="es-CO" sz="1200">
+                      <a:endParaRPr lang="es-CO" sz="1800" dirty="0">
                         <a:effectLst/>
                         <a:latin typeface="Calibri" panose="020F0502020204030204" pitchFamily="34" charset="0"/>
                         <a:ea typeface="Calibri" panose="020F0502020204030204" pitchFamily="34" charset="0"/>
@@ -8086,25 +8139,44 @@
                       </a:endParaRPr>
                     </a:p>
                   </a:txBody>
-                  <a:tcPr marL="68580" marR="68580" marT="0" marB="0"/>
+                  <a:tcPr/>
                 </a:tc>
+                <a:extLst>
+                  <a:ext uri="{0D108BD9-81ED-4DB2-BD59-A6C34878D82A}">
+                    <a16:rowId xmlns:a16="http://schemas.microsoft.com/office/drawing/2014/main" val="556949355"/>
+                  </a:ext>
+                </a:extLst>
+              </a:tr>
+              <a:tr h="360000">
                 <a:tc>
                   <a:txBody>
                     <a:bodyPr/>
                     <a:lstStyle/>
                     <a:p>
-                      <a:pPr algn="ctr">
+                      <a:pPr marL="0" marR="0" lvl="0" indent="0" algn="l" defTabSz="914400" rtl="0" eaLnBrk="1" fontAlgn="auto" latinLnBrk="0" hangingPunct="1">
+                        <a:lnSpc>
+                          <a:spcPct val="100000"/>
+                        </a:lnSpc>
                         <a:spcBef>
-                          <a:spcPts val="600"/>
+                          <a:spcPts val="0"/>
                         </a:spcBef>
+                        <a:spcAft>
+                          <a:spcPts val="0"/>
+                        </a:spcAft>
+                        <a:buClrTx/>
+                        <a:buSzTx/>
+                        <a:buFontTx/>
+                        <a:buNone/>
+                        <a:tabLst/>
+                        <a:defRPr/>
                       </a:pPr>
                       <a:r>
-                        <a:rPr lang="es-ES" sz="1200">
+                        <a:rPr lang="es-ES" sz="1800" dirty="0">
                           <a:effectLst/>
                         </a:rPr>
-                        <a:t>Exactitud</a:t>
+                        <a:t>F1</a:t>
                       </a:r>
-                      <a:endParaRPr lang="es-CO" sz="1200">
+                      <a:endParaRPr lang="es-CO" sz="1800" dirty="0">
                         <a:effectLst/>
                         <a:latin typeface="Calibri" panose="020F0502020204030204" pitchFamily="34" charset="0"/>
                         <a:ea typeface="Calibri" panose="020F0502020204030204" pitchFamily="34" charset="0"/>
@@ -8112,25 +8184,25 @@
                       </a:endParaRPr>
                     </a:p>
                   </a:txBody>
-                  <a:tcPr marL="68580" marR="68580" marT="0" marB="0"/>
+                  <a:tcPr/>
                 </a:tc>
                 <a:tc>
                   <a:txBody>
                     <a:bodyPr/>
                     <a:lstStyle/>
                     <a:p>
-                      <a:pPr algn="ctr">
+                      <a:pPr algn="l">
                         <a:spcBef>
                           <a:spcPts val="600"/>
                         </a:spcBef>
                       </a:pPr>
                       <a:r>
-                        <a:rPr lang="es-ES" sz="1200">
+                        <a:rPr lang="es-ES" sz="1800" dirty="0">
                           <a:effectLst/>
                         </a:rPr>
-                        <a:t>AUC</a:t>
+                        <a:t>0.982</a:t>
                       </a:r>
-                      <a:endParaRPr lang="es-CO" sz="1200">
+                      <a:endParaRPr lang="es-CO" sz="1800" dirty="0">
                         <a:effectLst/>
                         <a:latin typeface="Calibri" panose="020F0502020204030204" pitchFamily="34" charset="0"/>
                         <a:ea typeface="Calibri" panose="020F0502020204030204" pitchFamily="34" charset="0"/>
@@ -8138,25 +8210,44 @@
                       </a:endParaRPr>
                     </a:p>
                   </a:txBody>
-                  <a:tcPr marL="68580" marR="68580" marT="0" marB="0"/>
+                  <a:tcPr/>
                 </a:tc>
+                <a:extLst>
+                  <a:ext uri="{0D108BD9-81ED-4DB2-BD59-A6C34878D82A}">
+                    <a16:rowId xmlns:a16="http://schemas.microsoft.com/office/drawing/2014/main" val="560068297"/>
+                  </a:ext>
+                </a:extLst>
+              </a:tr>
+              <a:tr h="360000">
                 <a:tc>
                   <a:txBody>
                     <a:bodyPr/>
                     <a:lstStyle/>
                     <a:p>
-                      <a:pPr algn="ctr">
+                      <a:pPr marL="0" marR="0" lvl="0" indent="0" algn="l" defTabSz="914400" rtl="0" eaLnBrk="1" fontAlgn="auto" latinLnBrk="0" hangingPunct="1">
+                        <a:lnSpc>
+                          <a:spcPct val="100000"/>
+                        </a:lnSpc>
                         <a:spcBef>
-                          <a:spcPts val="600"/>
+                          <a:spcPts val="0"/>
                         </a:spcBef>
+                        <a:spcAft>
+                          <a:spcPts val="0"/>
+                        </a:spcAft>
+                        <a:buClrTx/>
+                        <a:buSzTx/>
+                        <a:buFontTx/>
+                        <a:buNone/>
+                        <a:tabLst/>
+                        <a:defRPr/>
                       </a:pPr>
                       <a:r>
-                        <a:rPr lang="es-ES" sz="1200">
+                        <a:rPr lang="es-ES" sz="1800" dirty="0">
                           <a:effectLst/>
                         </a:rPr>
-                        <a:t>Especificidad</a:t>
+                        <a:t>Exactitud</a:t>
                       </a:r>
-                      <a:endParaRPr lang="es-CO" sz="1200">
+                      <a:endParaRPr lang="es-CO" sz="1800" dirty="0">
                         <a:effectLst/>
                         <a:latin typeface="Calibri" panose="020F0502020204030204" pitchFamily="34" charset="0"/>
                         <a:ea typeface="Calibri" panose="020F0502020204030204" pitchFamily="34" charset="0"/>
@@ -8164,32 +8255,25 @@
                       </a:endParaRPr>
                     </a:p>
                   </a:txBody>
-                  <a:tcPr marL="68580" marR="68580" marT="0" marB="0"/>
+                  <a:tcPr/>
                 </a:tc>
-                <a:extLst>
-                  <a:ext uri="{0D108BD9-81ED-4DB2-BD59-A6C34878D82A}">
-                    <a16:rowId xmlns:a16="http://schemas.microsoft.com/office/drawing/2014/main" val="695997595"/>
-                  </a:ext>
-                </a:extLst>
-              </a:tr>
-              <a:tr h="0">
                 <a:tc>
                   <a:txBody>
                     <a:bodyPr/>
                     <a:lstStyle/>
                     <a:p>
-                      <a:pPr algn="ctr">
+                      <a:pPr algn="l">
                         <a:spcBef>
                           <a:spcPts val="600"/>
                         </a:spcBef>
                       </a:pPr>
                       <a:r>
-                        <a:rPr lang="es-ES" sz="1200" b="0" dirty="0">
+                        <a:rPr lang="es-ES" sz="1800" dirty="0">
                           <a:effectLst/>
                         </a:rPr>
                         <a:t>0.982</a:t>
                       </a:r>
-                      <a:endParaRPr lang="es-CO" sz="1200" b="0" dirty="0">
+                      <a:endParaRPr lang="es-CO" sz="1800" dirty="0">
                         <a:effectLst/>
                         <a:latin typeface="Calibri" panose="020F0502020204030204" pitchFamily="34" charset="0"/>
                         <a:ea typeface="Calibri" panose="020F0502020204030204" pitchFamily="34" charset="0"/>
@@ -8197,25 +8281,44 @@
                       </a:endParaRPr>
                     </a:p>
                   </a:txBody>
-                  <a:tcPr marL="68580" marR="68580" marT="0" marB="0"/>
+                  <a:tcPr/>
                 </a:tc>
+                <a:extLst>
+                  <a:ext uri="{0D108BD9-81ED-4DB2-BD59-A6C34878D82A}">
+                    <a16:rowId xmlns:a16="http://schemas.microsoft.com/office/drawing/2014/main" val="2326679667"/>
+                  </a:ext>
+                </a:extLst>
+              </a:tr>
+              <a:tr h="360000">
                 <a:tc>
                   <a:txBody>
                     <a:bodyPr/>
                     <a:lstStyle/>
                     <a:p>
-                      <a:pPr algn="ctr">
+                      <a:pPr marL="0" marR="0" lvl="0" indent="0" algn="l" defTabSz="914400" rtl="0" eaLnBrk="1" fontAlgn="auto" latinLnBrk="0" hangingPunct="1">
+                        <a:lnSpc>
+                          <a:spcPct val="100000"/>
+                        </a:lnSpc>
                         <a:spcBef>
-                          <a:spcPts val="600"/>
+                          <a:spcPts val="0"/>
                         </a:spcBef>
+                        <a:spcAft>
+                          <a:spcPts val="0"/>
+                        </a:spcAft>
+                        <a:buClrTx/>
+                        <a:buSzTx/>
+                        <a:buFontTx/>
+                        <a:buNone/>
+                        <a:tabLst/>
+                        <a:defRPr/>
                       </a:pPr>
                       <a:r>
-                        <a:rPr lang="es-ES" sz="1200">
+                        <a:rPr lang="es-ES" sz="1800" dirty="0">
                           <a:effectLst/>
                         </a:rPr>
-                        <a:t>0.982</a:t>
+                        <a:t>AUC</a:t>
                       </a:r>
-                      <a:endParaRPr lang="es-CO" sz="1200">
+                      <a:endParaRPr lang="es-CO" sz="1800" dirty="0">
                         <a:effectLst/>
                         <a:latin typeface="Calibri" panose="020F0502020204030204" pitchFamily="34" charset="0"/>
                         <a:ea typeface="Calibri" panose="020F0502020204030204" pitchFamily="34" charset="0"/>
@@ -8223,25 +8326,25 @@
                       </a:endParaRPr>
                     </a:p>
                   </a:txBody>
-                  <a:tcPr marL="68580" marR="68580" marT="0" marB="0"/>
+                  <a:tcPr/>
                 </a:tc>
                 <a:tc>
                   <a:txBody>
                     <a:bodyPr/>
                     <a:lstStyle/>
                     <a:p>
-                      <a:pPr algn="ctr">
+                      <a:pPr algn="l">
                         <a:spcBef>
                           <a:spcPts val="600"/>
                         </a:spcBef>
                       </a:pPr>
                       <a:r>
-                        <a:rPr lang="es-ES" sz="1200">
+                        <a:rPr lang="es-ES" sz="1800" dirty="0">
                           <a:effectLst/>
                         </a:rPr>
-                        <a:t>0.982</a:t>
+                        <a:t>0.999</a:t>
                       </a:r>
-                      <a:endParaRPr lang="es-CO" sz="1200">
+                      <a:endParaRPr lang="es-CO" sz="1800" dirty="0">
                         <a:effectLst/>
                         <a:latin typeface="Calibri" panose="020F0502020204030204" pitchFamily="34" charset="0"/>
                         <a:ea typeface="Calibri" panose="020F0502020204030204" pitchFamily="34" charset="0"/>
@@ -8249,25 +8352,76 @@
                       </a:endParaRPr>
                     </a:p>
                   </a:txBody>
-                  <a:tcPr marL="68580" marR="68580" marT="0" marB="0"/>
+                  <a:tcPr/>
+                </a:tc>
+                <a:extLst>
+                  <a:ext uri="{0D108BD9-81ED-4DB2-BD59-A6C34878D82A}">
+                    <a16:rowId xmlns:a16="http://schemas.microsoft.com/office/drawing/2014/main" val="1646438665"/>
+                  </a:ext>
+                </a:extLst>
+              </a:tr>
+              <a:tr h="360000">
+                <a:tc>
+                  <a:txBody>
+                    <a:bodyPr/>
+                    <a:lstStyle/>
+                    <a:p>
+                      <a:pPr marL="0" marR="0" lvl="0" indent="0" algn="l" defTabSz="914400" rtl="0" eaLnBrk="1" fontAlgn="auto" latinLnBrk="0" hangingPunct="1">
+                        <a:lnSpc>
+                          <a:spcPct val="100000"/>
+                        </a:lnSpc>
+                        <a:spcBef>
+                          <a:spcPts val="0"/>
+                        </a:spcBef>
+                        <a:spcAft>
+                          <a:spcPts val="0"/>
+                        </a:spcAft>
+                        <a:buClrTx/>
+                        <a:buSzTx/>
+                        <a:buFontTx/>
+                        <a:buNone/>
+                        <a:tabLst/>
+                        <a:defRPr/>
+                      </a:pPr>
+                      <a:r>
+                        <a:rPr lang="es-ES" sz="1800" dirty="0">
+                          <a:effectLst/>
+                        </a:rPr>
+                        <a:t>Especificidad</a:t>
+                      </a:r>
+                    </a:p>
+                  </a:txBody>
+                  <a:tcPr/>
                 </a:tc>
                 <a:tc>
                   <a:txBody>
                     <a:bodyPr/>
                     <a:lstStyle/>
                     <a:p>
-                      <a:pPr algn="ctr">
+                      <a:pPr marL="0" marR="0" lvl="0" indent="0" algn="l" defTabSz="914400" rtl="0" eaLnBrk="1" fontAlgn="auto" latinLnBrk="0" hangingPunct="1">
+                        <a:lnSpc>
+                          <a:spcPct val="100000"/>
+                        </a:lnSpc>
                         <a:spcBef>
-                          <a:spcPts val="600"/>
+                          <a:spcPts val="0"/>
                         </a:spcBef>
+                        <a:spcAft>
+                          <a:spcPts val="0"/>
+                        </a:spcAft>
+                        <a:buClrTx/>
+                        <a:buSzTx/>
+                        <a:buFontTx/>
+                        <a:buNone/>
+                        <a:tabLst/>
+                        <a:defRPr/>
                       </a:pPr>
                       <a:r>
-                        <a:rPr lang="es-ES" sz="1200">
+                        <a:rPr lang="es-ES" sz="1800" dirty="0">
                           <a:effectLst/>
                         </a:rPr>
-                        <a:t>0.982</a:t>
+                        <a:t>0.991</a:t>
                       </a:r>
-                      <a:endParaRPr lang="es-CO" sz="1200">
+                      <a:endParaRPr lang="es-CO" sz="1800" dirty="0">
                         <a:effectLst/>
                         <a:latin typeface="Calibri" panose="020F0502020204030204" pitchFamily="34" charset="0"/>
                         <a:ea typeface="Calibri" panose="020F0502020204030204" pitchFamily="34" charset="0"/>
@@ -8275,63 +8429,11 @@
                       </a:endParaRPr>
                     </a:p>
                   </a:txBody>
-                  <a:tcPr marL="68580" marR="68580" marT="0" marB="0"/>
-                </a:tc>
-                <a:tc>
-                  <a:txBody>
-                    <a:bodyPr/>
-                    <a:lstStyle/>
-                    <a:p>
-                      <a:pPr algn="ctr">
-                        <a:spcBef>
-                          <a:spcPts val="600"/>
-                        </a:spcBef>
-                      </a:pPr>
-                      <a:r>
-                        <a:rPr lang="es-ES" sz="1200">
-                          <a:effectLst/>
-                        </a:rPr>
-                        <a:t>0.999</a:t>
-                      </a:r>
-                      <a:endParaRPr lang="es-CO" sz="1200">
-                        <a:effectLst/>
-                        <a:latin typeface="Calibri" panose="020F0502020204030204" pitchFamily="34" charset="0"/>
-                        <a:ea typeface="Calibri" panose="020F0502020204030204" pitchFamily="34" charset="0"/>
-                        <a:cs typeface="Times New Roman" panose="02020603050405020304" pitchFamily="18" charset="0"/>
-                      </a:endParaRPr>
-                    </a:p>
-                  </a:txBody>
-                  <a:tcPr marL="68580" marR="68580" marT="0" marB="0"/>
-                </a:tc>
-                <a:tc>
-                  <a:txBody>
-                    <a:bodyPr/>
-                    <a:lstStyle/>
-                    <a:p>
-                      <a:pPr algn="ctr">
-                        <a:spcBef>
-                          <a:spcPts val="600"/>
-                        </a:spcBef>
-                      </a:pPr>
-                      <a:r>
-                        <a:rPr lang="es-ES" sz="1200" dirty="0">
-                          <a:effectLst/>
-                        </a:rPr>
-                        <a:t>0.991</a:t>
-                      </a:r>
-                      <a:endParaRPr lang="es-CO" sz="1200" dirty="0">
-                        <a:effectLst/>
-                        <a:latin typeface="Calibri" panose="020F0502020204030204" pitchFamily="34" charset="0"/>
-                        <a:ea typeface="Calibri" panose="020F0502020204030204" pitchFamily="34" charset="0"/>
-                        <a:cs typeface="Times New Roman" panose="02020603050405020304" pitchFamily="18" charset="0"/>
-                      </a:endParaRPr>
-                    </a:p>
-                  </a:txBody>
-                  <a:tcPr marL="68580" marR="68580" marT="0" marB="0"/>
+                  <a:tcPr/>
                 </a:tc>
                 <a:extLst>
                   <a:ext uri="{0D108BD9-81ED-4DB2-BD59-A6C34878D82A}">
-                    <a16:rowId xmlns:a16="http://schemas.microsoft.com/office/drawing/2014/main" val="2850795516"/>
+                    <a16:rowId xmlns:a16="http://schemas.microsoft.com/office/drawing/2014/main" val="3621784082"/>
                   </a:ext>
                 </a:extLst>
               </a:tr>
@@ -8510,8 +8612,8 @@
         </p:blipFill>
         <p:spPr>
           <a:xfrm>
-            <a:off x="1028700" y="2780614"/>
-            <a:ext cx="4076700" cy="2954655"/>
+            <a:off x="1341958" y="2506389"/>
+            <a:ext cx="4754042" cy="3445570"/>
           </a:xfrm>
           <a:prstGeom prst="rect">
             <a:avLst/>
@@ -8520,10 +8622,10 @@
       </p:pic>
       <p:graphicFrame>
         <p:nvGraphicFramePr>
-          <p:cNvPr id="2" name="Table 1">
-            <a:extLst>
-              <a:ext uri="{FF2B5EF4-FFF2-40B4-BE49-F238E27FC236}">
-                <a16:creationId xmlns:a16="http://schemas.microsoft.com/office/drawing/2014/main" id="{1D2733AC-2C9F-4F31-B7F7-AFC3DC220EEE}"/>
+          <p:cNvPr id="10" name="Table 2">
+            <a:extLst>
+              <a:ext uri="{FF2B5EF4-FFF2-40B4-BE49-F238E27FC236}">
+                <a16:creationId xmlns:a16="http://schemas.microsoft.com/office/drawing/2014/main" id="{672D93A3-06FE-484B-861A-7DCC6DFBBC91}"/>
               </a:ext>
             </a:extLst>
           </p:cNvPr>
@@ -8533,83 +8635,67 @@
           <p:nvPr>
             <p:extLst>
               <p:ext uri="{D42A27DB-BD31-4B8C-83A1-F6EECF244321}">
-                <p14:modId xmlns:p14="http://schemas.microsoft.com/office/powerpoint/2010/main" val="971525350"/>
+                <p14:modId xmlns:p14="http://schemas.microsoft.com/office/powerpoint/2010/main" val="83496673"/>
               </p:ext>
             </p:extLst>
           </p:nvPr>
         </p:nvGraphicFramePr>
         <p:xfrm>
-          <a:off x="5347596" y="3709301"/>
-          <a:ext cx="5815704" cy="548640"/>
+          <a:off x="7210700" y="2870170"/>
+          <a:ext cx="3256999" cy="2194560"/>
         </p:xfrm>
         <a:graphic>
           <a:graphicData uri="http://schemas.openxmlformats.org/drawingml/2006/table">
             <a:tbl>
-              <a:tblPr firstRow="1" firstCol="1" bandRow="1">
-                <a:tableStyleId>{5202B0CA-FC54-4496-8BCA-5EF66A818D29}</a:tableStyleId>
+              <a:tblPr firstRow="1" bandRow="1">
+                <a:tableStyleId>{5C22544A-7EE6-4342-B048-85BDC9FD1C3A}</a:tableStyleId>
               </a:tblPr>
               <a:tblGrid>
-                <a:gridCol w="1235349">
+                <a:gridCol w="1689653">
                   <a:extLst>
                     <a:ext uri="{9D8B030D-6E8A-4147-A177-3AD203B41FA5}">
-                      <a16:colId xmlns:a16="http://schemas.microsoft.com/office/drawing/2014/main" val="3516437018"/>
+                      <a16:colId xmlns:a16="http://schemas.microsoft.com/office/drawing/2014/main" val="2300131777"/>
                     </a:ext>
                   </a:extLst>
                 </a:gridCol>
-                <a:gridCol w="891573">
+                <a:gridCol w="1567346">
                   <a:extLst>
                     <a:ext uri="{9D8B030D-6E8A-4147-A177-3AD203B41FA5}">
-                      <a16:colId xmlns:a16="http://schemas.microsoft.com/office/drawing/2014/main" val="2098813446"/>
-                    </a:ext>
-                  </a:extLst>
-                </a:gridCol>
-                <a:gridCol w="887329">
-                  <a:extLst>
-                    <a:ext uri="{9D8B030D-6E8A-4147-A177-3AD203B41FA5}">
-                      <a16:colId xmlns:a16="http://schemas.microsoft.com/office/drawing/2014/main" val="1639120029"/>
-                    </a:ext>
-                  </a:extLst>
-                </a:gridCol>
-                <a:gridCol w="978285">
-                  <a:extLst>
-                    <a:ext uri="{9D8B030D-6E8A-4147-A177-3AD203B41FA5}">
-                      <a16:colId xmlns:a16="http://schemas.microsoft.com/office/drawing/2014/main" val="2491705246"/>
-                    </a:ext>
-                  </a:extLst>
-                </a:gridCol>
-                <a:gridCol w="1084738">
-                  <a:extLst>
-                    <a:ext uri="{9D8B030D-6E8A-4147-A177-3AD203B41FA5}">
-                      <a16:colId xmlns:a16="http://schemas.microsoft.com/office/drawing/2014/main" val="2687905980"/>
-                    </a:ext>
-                  </a:extLst>
-                </a:gridCol>
-                <a:gridCol w="738430">
-                  <a:extLst>
-                    <a:ext uri="{9D8B030D-6E8A-4147-A177-3AD203B41FA5}">
-                      <a16:colId xmlns:a16="http://schemas.microsoft.com/office/drawing/2014/main" val="3732305213"/>
+                      <a16:colId xmlns:a16="http://schemas.microsoft.com/office/drawing/2014/main" val="1477300347"/>
                     </a:ext>
                   </a:extLst>
                 </a:gridCol>
               </a:tblGrid>
-              <a:tr h="0">
+              <a:tr h="360000">
                 <a:tc>
                   <a:txBody>
                     <a:bodyPr/>
                     <a:lstStyle/>
                     <a:p>
-                      <a:pPr algn="ctr">
+                      <a:pPr marL="0" marR="0" lvl="0" indent="0" algn="l" defTabSz="914400" rtl="0" eaLnBrk="1" fontAlgn="auto" latinLnBrk="0" hangingPunct="1">
+                        <a:lnSpc>
+                          <a:spcPct val="100000"/>
+                        </a:lnSpc>
                         <a:spcBef>
-                          <a:spcPts val="600"/>
+                          <a:spcPts val="0"/>
                         </a:spcBef>
+                        <a:spcAft>
+                          <a:spcPts val="0"/>
+                        </a:spcAft>
+                        <a:buClrTx/>
+                        <a:buSzTx/>
+                        <a:buFontTx/>
+                        <a:buNone/>
+                        <a:tabLst/>
+                        <a:defRPr/>
                       </a:pPr>
                       <a:r>
-                        <a:rPr lang="es-ES" sz="1200">
+                        <a:rPr lang="es-ES" sz="1800" dirty="0">
                           <a:effectLst/>
                         </a:rPr>
                         <a:t>Sensibilidad</a:t>
                       </a:r>
-                      <a:endParaRPr lang="es-CO" sz="1200">
+                      <a:endParaRPr lang="es-CO" sz="1800" dirty="0">
                         <a:effectLst/>
                         <a:latin typeface="Calibri" panose="020F0502020204030204" pitchFamily="34" charset="0"/>
                         <a:ea typeface="Calibri" panose="020F0502020204030204" pitchFamily="34" charset="0"/>
@@ -8617,25 +8703,82 @@
                       </a:endParaRPr>
                     </a:p>
                   </a:txBody>
-                  <a:tcPr marL="68580" marR="68580" marT="0" marB="0"/>
+                  <a:tcPr/>
                 </a:tc>
                 <a:tc>
                   <a:txBody>
                     <a:bodyPr/>
                     <a:lstStyle/>
                     <a:p>
-                      <a:pPr algn="ctr">
+                      <a:pPr marL="0" marR="0" lvl="0" indent="0" algn="l" defTabSz="914400" rtl="0" eaLnBrk="1" fontAlgn="auto" latinLnBrk="0" hangingPunct="1">
+                        <a:lnSpc>
+                          <a:spcPct val="100000"/>
+                        </a:lnSpc>
                         <a:spcBef>
-                          <a:spcPts val="600"/>
+                          <a:spcPts val="0"/>
                         </a:spcBef>
+                        <a:spcAft>
+                          <a:spcPts val="0"/>
+                        </a:spcAft>
+                        <a:buClrTx/>
+                        <a:buSzTx/>
+                        <a:buFontTx/>
+                        <a:buNone/>
+                        <a:tabLst/>
+                        <a:defRPr/>
                       </a:pPr>
                       <a:r>
-                        <a:rPr lang="es-ES" sz="1200">
+                        <a:rPr lang="es-ES" sz="1800" b="0" dirty="0">
+                          <a:effectLst/>
+                        </a:rPr>
+                        <a:t>0.95</a:t>
+                      </a:r>
+                      <a:endParaRPr lang="es-CO" sz="1800" b="0" dirty="0">
+                        <a:effectLst/>
+                        <a:latin typeface="Calibri" panose="020F0502020204030204" pitchFamily="34" charset="0"/>
+                        <a:ea typeface="+mn-ea"/>
+                        <a:cs typeface="Times New Roman" panose="02020603050405020304" pitchFamily="18" charset="0"/>
+                      </a:endParaRPr>
+                    </a:p>
+                  </a:txBody>
+                  <a:tcPr/>
+                </a:tc>
+                <a:extLst>
+                  <a:ext uri="{0D108BD9-81ED-4DB2-BD59-A6C34878D82A}">
+                    <a16:rowId xmlns:a16="http://schemas.microsoft.com/office/drawing/2014/main" val="750535927"/>
+                  </a:ext>
+                </a:extLst>
+              </a:tr>
+              <a:tr h="360000">
+                <a:tc>
+                  <a:txBody>
+                    <a:bodyPr/>
+                    <a:lstStyle/>
+                    <a:p>
+                      <a:pPr marL="0" marR="0" lvl="0" indent="0" algn="l" defTabSz="914400" rtl="0" eaLnBrk="1" fontAlgn="auto" latinLnBrk="0" hangingPunct="1">
+                        <a:lnSpc>
+                          <a:spcPct val="100000"/>
+                        </a:lnSpc>
+                        <a:spcBef>
+                          <a:spcPts val="0"/>
+                        </a:spcBef>
+                        <a:spcAft>
+                          <a:spcPts val="0"/>
+                        </a:spcAft>
+                        <a:buClrTx/>
+                        <a:buSzTx/>
+                        <a:buFontTx/>
+                        <a:buNone/>
+                        <a:tabLst/>
+                        <a:defRPr/>
+                      </a:pPr>
+                      <a:r>
+                        <a:rPr lang="es-ES" sz="1800" dirty="0">
                           <a:effectLst/>
                         </a:rPr>
                         <a:t>Precisión</a:t>
                       </a:r>
-                      <a:endParaRPr lang="es-CO" sz="1200">
+                      <a:endParaRPr lang="es-CO" sz="1800" dirty="0">
                         <a:effectLst/>
                         <a:latin typeface="Calibri" panose="020F0502020204030204" pitchFamily="34" charset="0"/>
                         <a:ea typeface="Calibri" panose="020F0502020204030204" pitchFamily="34" charset="0"/>
@@ -8643,25 +8786,37 @@
                       </a:endParaRPr>
                     </a:p>
                   </a:txBody>
-                  <a:tcPr marL="68580" marR="68580" marT="0" marB="0"/>
+                  <a:tcPr/>
                 </a:tc>
                 <a:tc>
                   <a:txBody>
                     <a:bodyPr/>
                     <a:lstStyle/>
                     <a:p>
-                      <a:pPr algn="ctr">
+                      <a:pPr marL="0" marR="0" lvl="0" indent="0" algn="l" defTabSz="914400" rtl="0" eaLnBrk="1" fontAlgn="auto" latinLnBrk="0" hangingPunct="1">
+                        <a:lnSpc>
+                          <a:spcPct val="100000"/>
+                        </a:lnSpc>
                         <a:spcBef>
-                          <a:spcPts val="600"/>
+                          <a:spcPts val="0"/>
                         </a:spcBef>
+                        <a:spcAft>
+                          <a:spcPts val="0"/>
+                        </a:spcAft>
+                        <a:buClrTx/>
+                        <a:buSzTx/>
+                        <a:buFontTx/>
+                        <a:buNone/>
+                        <a:tabLst/>
+                        <a:defRPr/>
                       </a:pPr>
                       <a:r>
-                        <a:rPr lang="es-ES" sz="1200">
+                        <a:rPr lang="es-ES" sz="1800" dirty="0">
                           <a:effectLst/>
                         </a:rPr>
-                        <a:t>F1</a:t>
+                        <a:t>0.95</a:t>
                       </a:r>
-                      <a:endParaRPr lang="es-CO" sz="1200">
+                      <a:endParaRPr lang="es-CO" sz="1800" dirty="0">
                         <a:effectLst/>
                         <a:latin typeface="Calibri" panose="020F0502020204030204" pitchFamily="34" charset="0"/>
                         <a:ea typeface="Calibri" panose="020F0502020204030204" pitchFamily="34" charset="0"/>
@@ -8669,25 +8824,44 @@
                       </a:endParaRPr>
                     </a:p>
                   </a:txBody>
-                  <a:tcPr marL="68580" marR="68580" marT="0" marB="0"/>
+                  <a:tcPr/>
                 </a:tc>
+                <a:extLst>
+                  <a:ext uri="{0D108BD9-81ED-4DB2-BD59-A6C34878D82A}">
+                    <a16:rowId xmlns:a16="http://schemas.microsoft.com/office/drawing/2014/main" val="556949355"/>
+                  </a:ext>
+                </a:extLst>
+              </a:tr>
+              <a:tr h="360000">
                 <a:tc>
                   <a:txBody>
                     <a:bodyPr/>
                     <a:lstStyle/>
                     <a:p>
-                      <a:pPr algn="ctr">
+                      <a:pPr marL="0" marR="0" lvl="0" indent="0" algn="l" defTabSz="914400" rtl="0" eaLnBrk="1" fontAlgn="auto" latinLnBrk="0" hangingPunct="1">
+                        <a:lnSpc>
+                          <a:spcPct val="100000"/>
+                        </a:lnSpc>
                         <a:spcBef>
-                          <a:spcPts val="600"/>
+                          <a:spcPts val="0"/>
                         </a:spcBef>
+                        <a:spcAft>
+                          <a:spcPts val="0"/>
+                        </a:spcAft>
+                        <a:buClrTx/>
+                        <a:buSzTx/>
+                        <a:buFontTx/>
+                        <a:buNone/>
+                        <a:tabLst/>
+                        <a:defRPr/>
                       </a:pPr>
                       <a:r>
-                        <a:rPr lang="es-ES" sz="1200">
+                        <a:rPr lang="es-ES" sz="1800" dirty="0">
                           <a:effectLst/>
                         </a:rPr>
-                        <a:t>Exactitud</a:t>
+                        <a:t>F1</a:t>
                       </a:r>
-                      <a:endParaRPr lang="es-CO" sz="1200">
+                      <a:endParaRPr lang="es-CO" sz="1800" dirty="0">
                         <a:effectLst/>
                         <a:latin typeface="Calibri" panose="020F0502020204030204" pitchFamily="34" charset="0"/>
                         <a:ea typeface="Calibri" panose="020F0502020204030204" pitchFamily="34" charset="0"/>
@@ -8695,25 +8869,25 @@
                       </a:endParaRPr>
                     </a:p>
                   </a:txBody>
-                  <a:tcPr marL="68580" marR="68580" marT="0" marB="0"/>
+                  <a:tcPr/>
                 </a:tc>
                 <a:tc>
                   <a:txBody>
                     <a:bodyPr/>
                     <a:lstStyle/>
                     <a:p>
-                      <a:pPr algn="ctr">
+                      <a:pPr algn="l">
                         <a:spcBef>
                           <a:spcPts val="600"/>
                         </a:spcBef>
                       </a:pPr>
                       <a:r>
-                        <a:rPr lang="es-ES" sz="1200">
+                        <a:rPr lang="es-ES" sz="1800" dirty="0">
                           <a:effectLst/>
                         </a:rPr>
-                        <a:t>AUC</a:t>
+                        <a:t>0.95</a:t>
                       </a:r>
-                      <a:endParaRPr lang="es-CO" sz="1200">
+                      <a:endParaRPr lang="es-CO" sz="1800" dirty="0">
                         <a:effectLst/>
                         <a:latin typeface="Calibri" panose="020F0502020204030204" pitchFamily="34" charset="0"/>
                         <a:ea typeface="Calibri" panose="020F0502020204030204" pitchFamily="34" charset="0"/>
@@ -8721,25 +8895,44 @@
                       </a:endParaRPr>
                     </a:p>
                   </a:txBody>
-                  <a:tcPr marL="68580" marR="68580" marT="0" marB="0"/>
+                  <a:tcPr/>
                 </a:tc>
+                <a:extLst>
+                  <a:ext uri="{0D108BD9-81ED-4DB2-BD59-A6C34878D82A}">
+                    <a16:rowId xmlns:a16="http://schemas.microsoft.com/office/drawing/2014/main" val="560068297"/>
+                  </a:ext>
+                </a:extLst>
+              </a:tr>
+              <a:tr h="360000">
                 <a:tc>
                   <a:txBody>
                     <a:bodyPr/>
                     <a:lstStyle/>
                     <a:p>
-                      <a:pPr algn="ctr">
+                      <a:pPr marL="0" marR="0" lvl="0" indent="0" algn="l" defTabSz="914400" rtl="0" eaLnBrk="1" fontAlgn="auto" latinLnBrk="0" hangingPunct="1">
+                        <a:lnSpc>
+                          <a:spcPct val="100000"/>
+                        </a:lnSpc>
                         <a:spcBef>
-                          <a:spcPts val="600"/>
+                          <a:spcPts val="0"/>
                         </a:spcBef>
+                        <a:spcAft>
+                          <a:spcPts val="0"/>
+                        </a:spcAft>
+                        <a:buClrTx/>
+                        <a:buSzTx/>
+                        <a:buFontTx/>
+                        <a:buNone/>
+                        <a:tabLst/>
+                        <a:defRPr/>
                       </a:pPr>
                       <a:r>
-                        <a:rPr lang="es-ES" sz="1200">
+                        <a:rPr lang="es-ES" sz="1800" dirty="0">
                           <a:effectLst/>
                         </a:rPr>
-                        <a:t>Especificidad</a:t>
+                        <a:t>Exactitud</a:t>
                       </a:r>
-                      <a:endParaRPr lang="es-CO" sz="1200">
+                      <a:endParaRPr lang="es-CO" sz="1800" dirty="0">
                         <a:effectLst/>
                         <a:latin typeface="Calibri" panose="020F0502020204030204" pitchFamily="34" charset="0"/>
                         <a:ea typeface="Calibri" panose="020F0502020204030204" pitchFamily="34" charset="0"/>
@@ -8747,32 +8940,25 @@
                       </a:endParaRPr>
                     </a:p>
                   </a:txBody>
-                  <a:tcPr marL="68580" marR="68580" marT="0" marB="0"/>
+                  <a:tcPr/>
                 </a:tc>
-                <a:extLst>
-                  <a:ext uri="{0D108BD9-81ED-4DB2-BD59-A6C34878D82A}">
-                    <a16:rowId xmlns:a16="http://schemas.microsoft.com/office/drawing/2014/main" val="613894309"/>
-                  </a:ext>
-                </a:extLst>
-              </a:tr>
-              <a:tr h="0">
                 <a:tc>
                   <a:txBody>
                     <a:bodyPr/>
                     <a:lstStyle/>
                     <a:p>
-                      <a:pPr algn="ctr">
+                      <a:pPr algn="l">
                         <a:spcBef>
                           <a:spcPts val="600"/>
                         </a:spcBef>
                       </a:pPr>
                       <a:r>
-                        <a:rPr lang="es-ES" sz="1200" b="0" dirty="0">
+                        <a:rPr lang="es-ES" sz="1800" dirty="0">
                           <a:effectLst/>
                         </a:rPr>
                         <a:t>0.95</a:t>
                       </a:r>
-                      <a:endParaRPr lang="es-CO" sz="1200" b="0" dirty="0">
+                      <a:endParaRPr lang="es-CO" sz="1800" dirty="0">
                         <a:effectLst/>
                         <a:latin typeface="Calibri" panose="020F0502020204030204" pitchFamily="34" charset="0"/>
                         <a:ea typeface="Calibri" panose="020F0502020204030204" pitchFamily="34" charset="0"/>
@@ -8780,25 +8966,44 @@
                       </a:endParaRPr>
                     </a:p>
                   </a:txBody>
-                  <a:tcPr marL="68580" marR="68580" marT="0" marB="0"/>
+                  <a:tcPr/>
                 </a:tc>
+                <a:extLst>
+                  <a:ext uri="{0D108BD9-81ED-4DB2-BD59-A6C34878D82A}">
+                    <a16:rowId xmlns:a16="http://schemas.microsoft.com/office/drawing/2014/main" val="2326679667"/>
+                  </a:ext>
+                </a:extLst>
+              </a:tr>
+              <a:tr h="360000">
                 <a:tc>
                   <a:txBody>
                     <a:bodyPr/>
                     <a:lstStyle/>
                     <a:p>
-                      <a:pPr algn="ctr">
+                      <a:pPr marL="0" marR="0" lvl="0" indent="0" algn="l" defTabSz="914400" rtl="0" eaLnBrk="1" fontAlgn="auto" latinLnBrk="0" hangingPunct="1">
+                        <a:lnSpc>
+                          <a:spcPct val="100000"/>
+                        </a:lnSpc>
                         <a:spcBef>
-                          <a:spcPts val="600"/>
+                          <a:spcPts val="0"/>
                         </a:spcBef>
+                        <a:spcAft>
+                          <a:spcPts val="0"/>
+                        </a:spcAft>
+                        <a:buClrTx/>
+                        <a:buSzTx/>
+                        <a:buFontTx/>
+                        <a:buNone/>
+                        <a:tabLst/>
+                        <a:defRPr/>
                       </a:pPr>
                       <a:r>
-                        <a:rPr lang="es-ES" sz="1200">
+                        <a:rPr lang="es-ES" sz="1800" dirty="0">
                           <a:effectLst/>
                         </a:rPr>
-                        <a:t>0.95</a:t>
+                        <a:t>AUC</a:t>
                       </a:r>
-                      <a:endParaRPr lang="es-CO" sz="1200">
+                      <a:endParaRPr lang="es-CO" sz="1800" dirty="0">
                         <a:effectLst/>
                         <a:latin typeface="Calibri" panose="020F0502020204030204" pitchFamily="34" charset="0"/>
                         <a:ea typeface="Calibri" panose="020F0502020204030204" pitchFamily="34" charset="0"/>
@@ -8806,25 +9011,25 @@
                       </a:endParaRPr>
                     </a:p>
                   </a:txBody>
-                  <a:tcPr marL="68580" marR="68580" marT="0" marB="0"/>
+                  <a:tcPr/>
                 </a:tc>
                 <a:tc>
                   <a:txBody>
                     <a:bodyPr/>
                     <a:lstStyle/>
                     <a:p>
-                      <a:pPr algn="ctr">
+                      <a:pPr algn="l">
                         <a:spcBef>
                           <a:spcPts val="600"/>
                         </a:spcBef>
                       </a:pPr>
                       <a:r>
-                        <a:rPr lang="es-ES" sz="1200">
+                        <a:rPr lang="es-ES" sz="1800" dirty="0">
                           <a:effectLst/>
                         </a:rPr>
-                        <a:t>0.95</a:t>
+                        <a:t>0.98</a:t>
                       </a:r>
-                      <a:endParaRPr lang="es-CO" sz="1200">
+                      <a:endParaRPr lang="es-CO" sz="1800" dirty="0">
                         <a:effectLst/>
                         <a:latin typeface="Calibri" panose="020F0502020204030204" pitchFamily="34" charset="0"/>
                         <a:ea typeface="Calibri" panose="020F0502020204030204" pitchFamily="34" charset="0"/>
@@ -8832,25 +9037,76 @@
                       </a:endParaRPr>
                     </a:p>
                   </a:txBody>
-                  <a:tcPr marL="68580" marR="68580" marT="0" marB="0"/>
+                  <a:tcPr/>
+                </a:tc>
+                <a:extLst>
+                  <a:ext uri="{0D108BD9-81ED-4DB2-BD59-A6C34878D82A}">
+                    <a16:rowId xmlns:a16="http://schemas.microsoft.com/office/drawing/2014/main" val="1646438665"/>
+                  </a:ext>
+                </a:extLst>
+              </a:tr>
+              <a:tr h="360000">
+                <a:tc>
+                  <a:txBody>
+                    <a:bodyPr/>
+                    <a:lstStyle/>
+                    <a:p>
+                      <a:pPr marL="0" marR="0" lvl="0" indent="0" algn="l" defTabSz="914400" rtl="0" eaLnBrk="1" fontAlgn="auto" latinLnBrk="0" hangingPunct="1">
+                        <a:lnSpc>
+                          <a:spcPct val="100000"/>
+                        </a:lnSpc>
+                        <a:spcBef>
+                          <a:spcPts val="0"/>
+                        </a:spcBef>
+                        <a:spcAft>
+                          <a:spcPts val="0"/>
+                        </a:spcAft>
+                        <a:buClrTx/>
+                        <a:buSzTx/>
+                        <a:buFontTx/>
+                        <a:buNone/>
+                        <a:tabLst/>
+                        <a:defRPr/>
+                      </a:pPr>
+                      <a:r>
+                        <a:rPr lang="es-ES" sz="1800" dirty="0">
+                          <a:effectLst/>
+                        </a:rPr>
+                        <a:t>Especificidad</a:t>
+                      </a:r>
+                    </a:p>
+                  </a:txBody>
+                  <a:tcPr/>
                 </a:tc>
                 <a:tc>
                   <a:txBody>
                     <a:bodyPr/>
                     <a:lstStyle/>
                     <a:p>
-                      <a:pPr algn="ctr">
+                      <a:pPr marL="0" marR="0" lvl="0" indent="0" algn="l" defTabSz="914400" rtl="0" eaLnBrk="1" fontAlgn="auto" latinLnBrk="0" hangingPunct="1">
+                        <a:lnSpc>
+                          <a:spcPct val="100000"/>
+                        </a:lnSpc>
                         <a:spcBef>
-                          <a:spcPts val="600"/>
+                          <a:spcPts val="0"/>
                         </a:spcBef>
+                        <a:spcAft>
+                          <a:spcPts val="0"/>
+                        </a:spcAft>
+                        <a:buClrTx/>
+                        <a:buSzTx/>
+                        <a:buFontTx/>
+                        <a:buNone/>
+                        <a:tabLst/>
+                        <a:defRPr/>
                       </a:pPr>
                       <a:r>
-                        <a:rPr lang="es-ES" sz="1200">
+                        <a:rPr lang="es-ES" sz="1800" dirty="0">
                           <a:effectLst/>
                         </a:rPr>
-                        <a:t>0.95</a:t>
+                        <a:t>0.98</a:t>
                       </a:r>
-                      <a:endParaRPr lang="es-CO" sz="1200">
+                      <a:endParaRPr lang="es-CO" sz="1800" dirty="0">
                         <a:effectLst/>
                         <a:latin typeface="Calibri" panose="020F0502020204030204" pitchFamily="34" charset="0"/>
                         <a:ea typeface="Calibri" panose="020F0502020204030204" pitchFamily="34" charset="0"/>
@@ -8858,63 +9114,11 @@
                       </a:endParaRPr>
                     </a:p>
                   </a:txBody>
-                  <a:tcPr marL="68580" marR="68580" marT="0" marB="0"/>
-                </a:tc>
-                <a:tc>
-                  <a:txBody>
-                    <a:bodyPr/>
-                    <a:lstStyle/>
-                    <a:p>
-                      <a:pPr algn="ctr">
-                        <a:spcBef>
-                          <a:spcPts val="600"/>
-                        </a:spcBef>
-                      </a:pPr>
-                      <a:r>
-                        <a:rPr lang="es-ES" sz="1200">
-                          <a:effectLst/>
-                        </a:rPr>
-                        <a:t>0.98</a:t>
-                      </a:r>
-                      <a:endParaRPr lang="es-CO" sz="1200">
-                        <a:effectLst/>
-                        <a:latin typeface="Calibri" panose="020F0502020204030204" pitchFamily="34" charset="0"/>
-                        <a:ea typeface="Calibri" panose="020F0502020204030204" pitchFamily="34" charset="0"/>
-                        <a:cs typeface="Times New Roman" panose="02020603050405020304" pitchFamily="18" charset="0"/>
-                      </a:endParaRPr>
-                    </a:p>
-                  </a:txBody>
-                  <a:tcPr marL="68580" marR="68580" marT="0" marB="0"/>
-                </a:tc>
-                <a:tc>
-                  <a:txBody>
-                    <a:bodyPr/>
-                    <a:lstStyle/>
-                    <a:p>
-                      <a:pPr algn="ctr">
-                        <a:spcBef>
-                          <a:spcPts val="600"/>
-                        </a:spcBef>
-                      </a:pPr>
-                      <a:r>
-                        <a:rPr lang="es-ES" sz="1200" dirty="0">
-                          <a:effectLst/>
-                        </a:rPr>
-                        <a:t>0.98</a:t>
-                      </a:r>
-                      <a:endParaRPr lang="es-CO" sz="1200" dirty="0">
-                        <a:effectLst/>
-                        <a:latin typeface="Calibri" panose="020F0502020204030204" pitchFamily="34" charset="0"/>
-                        <a:ea typeface="Calibri" panose="020F0502020204030204" pitchFamily="34" charset="0"/>
-                        <a:cs typeface="Times New Roman" panose="02020603050405020304" pitchFamily="18" charset="0"/>
-                      </a:endParaRPr>
-                    </a:p>
-                  </a:txBody>
-                  <a:tcPr marL="68580" marR="68580" marT="0" marB="0"/>
+                  <a:tcPr/>
                 </a:tc>
                 <a:extLst>
                   <a:ext uri="{0D108BD9-81ED-4DB2-BD59-A6C34878D82A}">
-                    <a16:rowId xmlns:a16="http://schemas.microsoft.com/office/drawing/2014/main" val="1100695617"/>
+                    <a16:rowId xmlns:a16="http://schemas.microsoft.com/office/drawing/2014/main" val="3621784082"/>
                   </a:ext>
                 </a:extLst>
               </a:tr>
@@ -9511,9 +9715,10 @@
           <a:bodyPr/>
           <a:lstStyle/>
           <a:p>
+            <a:pPr algn="ctr"/>
             <a:r>
               <a:rPr lang="es-CO" sz="9600" dirty="0"/>
-              <a:t>Preguntas?</a:t>
+              <a:t>Gracias</a:t>
             </a:r>
           </a:p>
         </p:txBody>
@@ -10619,7 +10824,7 @@
               <a:rPr lang="es-CO" dirty="0">
                 <a:cs typeface="Calibri"/>
               </a:rPr>
-              <a:t> K-Vecinos (KNN) </a:t>
+              <a:t>K-Vecinos (KNN) </a:t>
             </a:r>
           </a:p>
           <a:p>
@@ -10634,19 +10839,7 @@
               <a:rPr lang="es-CO" dirty="0">
                 <a:cs typeface="Calibri"/>
               </a:rPr>
-              <a:t> </a:t>
-            </a:r>
-            <a:r>
-              <a:rPr lang="es-CO" dirty="0" err="1">
-                <a:cs typeface="Calibri"/>
-              </a:rPr>
-              <a:t>Random</a:t>
-            </a:r>
-            <a:r>
-              <a:rPr lang="es-CO" dirty="0">
-                <a:cs typeface="Calibri"/>
-              </a:rPr>
-              <a:t> </a:t>
+              <a:t>Random </a:t>
             </a:r>
             <a:r>
               <a:rPr lang="es-CO" dirty="0" err="1">
@@ -10906,14 +11099,14 @@
           <p:nvPr>
             <p:extLst>
               <p:ext uri="{D42A27DB-BD31-4B8C-83A1-F6EECF244321}">
-                <p14:modId xmlns:p14="http://schemas.microsoft.com/office/powerpoint/2010/main" val="1221800450"/>
+                <p14:modId xmlns:p14="http://schemas.microsoft.com/office/powerpoint/2010/main" val="2497642211"/>
               </p:ext>
             </p:extLst>
           </p:nvPr>
         </p:nvGraphicFramePr>
         <p:xfrm>
           <a:off x="695446" y="3194760"/>
-          <a:ext cx="4514252" cy="1579434"/>
+          <a:ext cx="4514252" cy="1575528"/>
         </p:xfrm>
         <a:graphic>
           <a:graphicData uri="http://schemas.openxmlformats.org/drawingml/2006/table">
@@ -10981,12 +11174,12 @@
                         </a:spcAft>
                       </a:pPr>
                       <a:r>
-                        <a:rPr lang="en-US" sz="1100">
+                        <a:rPr lang="en-US" sz="2000" dirty="0">
                           <a:effectLst/>
                         </a:rPr>
-                        <a:t>Kaggle (https://www.kaggle.com/saurabhshahane/mango-varieties-classification)</a:t>
+                        <a:t>Kaggle</a:t>
                       </a:r>
-                      <a:endParaRPr lang="es-CO" sz="1100">
+                      <a:endParaRPr lang="es-CO" sz="2000" dirty="0">
                         <a:effectLst/>
                         <a:latin typeface="Calibri" panose="020F0502020204030204" pitchFamily="34" charset="0"/>
                         <a:ea typeface="Calibri" panose="020F0502020204030204" pitchFamily="34" charset="0"/>
@@ -11046,36 +11239,36 @@
                         </a:spcAft>
                       </a:pPr>
                       <a:r>
-                        <a:rPr lang="en-US" sz="1100" dirty="0">
+                        <a:rPr lang="en-US" sz="1600" dirty="0">
                           <a:effectLst/>
                         </a:rPr>
                         <a:t>600 (200 </a:t>
                       </a:r>
                       <a:r>
-                        <a:rPr lang="en-US" sz="1100" dirty="0" err="1">
+                        <a:rPr lang="en-US" sz="1600" dirty="0" err="1">
                           <a:effectLst/>
                         </a:rPr>
                         <a:t>por</a:t>
                       </a:r>
                       <a:r>
-                        <a:rPr lang="en-US" sz="1100" dirty="0">
+                        <a:rPr lang="en-US" sz="1600" dirty="0">
                           <a:effectLst/>
                         </a:rPr>
                         <a:t> </a:t>
                       </a:r>
                       <a:r>
-                        <a:rPr lang="en-US" sz="1100" dirty="0" err="1">
+                        <a:rPr lang="en-US" sz="1600" dirty="0" err="1">
                           <a:effectLst/>
                         </a:rPr>
                         <a:t>clase</a:t>
                       </a:r>
                       <a:r>
-                        <a:rPr lang="en-US" sz="1100" dirty="0">
+                        <a:rPr lang="en-US" sz="1600" dirty="0">
                           <a:effectLst/>
                         </a:rPr>
                         <a:t>)</a:t>
                       </a:r>
-                      <a:endParaRPr lang="es-CO" sz="1100" dirty="0">
+                      <a:endParaRPr lang="es-CO" sz="1600" dirty="0">
                         <a:effectLst/>
                         <a:latin typeface="Calibri" panose="020F0502020204030204" pitchFamily="34" charset="0"/>
                         <a:ea typeface="Calibri" panose="020F0502020204030204" pitchFamily="34" charset="0"/>
@@ -11135,24 +11328,24 @@
                         </a:spcAft>
                       </a:pPr>
                       <a:r>
-                        <a:rPr lang="es-CO" sz="1100" dirty="0" err="1">
+                        <a:rPr lang="es-CO" sz="1600" dirty="0" err="1">
                           <a:effectLst/>
                         </a:rPr>
                         <a:t>Imagenes</a:t>
                       </a:r>
                       <a:r>
-                        <a:rPr lang="es-CO" sz="1100" dirty="0">
+                        <a:rPr lang="es-CO" sz="1600" dirty="0">
                           <a:effectLst/>
                         </a:rPr>
                         <a:t> RGB desde 480x757 hasta 350x511 </a:t>
                       </a:r>
                       <a:r>
-                        <a:rPr lang="es-CO" sz="1100" dirty="0" err="1">
+                        <a:rPr lang="es-CO" sz="1600" dirty="0" err="1">
                           <a:effectLst/>
                         </a:rPr>
                         <a:t>pixels</a:t>
                       </a:r>
-                      <a:endParaRPr lang="es-CO" sz="1100" dirty="0">
+                      <a:endParaRPr lang="es-CO" sz="1600" dirty="0">
                         <a:effectLst/>
                         <a:latin typeface="Calibri" panose="020F0502020204030204" pitchFamily="34" charset="0"/>
                         <a:ea typeface="Calibri" panose="020F0502020204030204" pitchFamily="34" charset="0"/>
@@ -11226,14 +11419,14 @@
           <p:nvPr>
             <p:extLst>
               <p:ext uri="{D42A27DB-BD31-4B8C-83A1-F6EECF244321}">
-                <p14:modId xmlns:p14="http://schemas.microsoft.com/office/powerpoint/2010/main" val="737753512"/>
+                <p14:modId xmlns:p14="http://schemas.microsoft.com/office/powerpoint/2010/main" val="568937746"/>
               </p:ext>
             </p:extLst>
           </p:nvPr>
         </p:nvGraphicFramePr>
         <p:xfrm>
           <a:off x="6582074" y="3193181"/>
-          <a:ext cx="4514252" cy="1579434"/>
+          <a:ext cx="4514252" cy="1575528"/>
         </p:xfrm>
         <a:graphic>
           <a:graphicData uri="http://schemas.openxmlformats.org/drawingml/2006/table">
@@ -11301,12 +11494,12 @@
                         </a:spcAft>
                       </a:pPr>
                       <a:r>
-                        <a:rPr lang="en-US" sz="1100">
+                        <a:rPr lang="en-US" sz="2000" dirty="0">
                           <a:effectLst/>
                         </a:rPr>
-                        <a:t>Kaggle (https://www.kaggle.com/saurabhshahane/mango-varieties-classification)</a:t>
+                        <a:t>Kaggle</a:t>
                       </a:r>
-                      <a:endParaRPr lang="es-CO" sz="1100">
+                      <a:endParaRPr lang="es-CO" sz="2000" dirty="0">
                         <a:effectLst/>
                         <a:latin typeface="Calibri" panose="020F0502020204030204" pitchFamily="34" charset="0"/>
                         <a:ea typeface="Calibri" panose="020F0502020204030204" pitchFamily="34" charset="0"/>
@@ -11366,36 +11559,36 @@
                         </a:spcAft>
                       </a:pPr>
                       <a:r>
-                        <a:rPr lang="en-US" sz="1100" dirty="0">
+                        <a:rPr lang="en-US" sz="1600" dirty="0">
                           <a:effectLst/>
                         </a:rPr>
                         <a:t>6000 (2000 </a:t>
                       </a:r>
                       <a:r>
-                        <a:rPr lang="en-US" sz="1100" dirty="0" err="1">
+                        <a:rPr lang="en-US" sz="1600" dirty="0" err="1">
                           <a:effectLst/>
                         </a:rPr>
                         <a:t>por</a:t>
                       </a:r>
                       <a:r>
-                        <a:rPr lang="en-US" sz="1100" dirty="0">
+                        <a:rPr lang="en-US" sz="1600" dirty="0">
                           <a:effectLst/>
                         </a:rPr>
                         <a:t> </a:t>
                       </a:r>
                       <a:r>
-                        <a:rPr lang="en-US" sz="1100" dirty="0" err="1">
+                        <a:rPr lang="en-US" sz="1600" dirty="0" err="1">
                           <a:effectLst/>
                         </a:rPr>
                         <a:t>clase</a:t>
                       </a:r>
                       <a:r>
-                        <a:rPr lang="en-US" sz="1100" dirty="0">
+                        <a:rPr lang="en-US" sz="1600" dirty="0">
                           <a:effectLst/>
                         </a:rPr>
                         <a:t>)</a:t>
                       </a:r>
-                      <a:endParaRPr lang="es-CO" sz="1100" dirty="0">
+                      <a:endParaRPr lang="es-CO" sz="1600" dirty="0">
                         <a:effectLst/>
                         <a:latin typeface="Calibri" panose="020F0502020204030204" pitchFamily="34" charset="0"/>
                         <a:ea typeface="Calibri" panose="020F0502020204030204" pitchFamily="34" charset="0"/>
@@ -11455,18 +11648,18 @@
                         </a:spcAft>
                       </a:pPr>
                       <a:r>
-                        <a:rPr lang="es-CO" sz="1100" dirty="0" err="1">
+                        <a:rPr lang="es-CO" sz="1600" dirty="0" err="1">
                           <a:effectLst/>
                         </a:rPr>
                         <a:t>Imagenes</a:t>
                       </a:r>
                       <a:r>
-                        <a:rPr lang="es-CO" sz="1100" dirty="0">
+                        <a:rPr lang="es-CO" sz="1600" dirty="0">
                           <a:effectLst/>
                         </a:rPr>
                         <a:t> RGB 32x32 pixeles</a:t>
                       </a:r>
-                      <a:endParaRPr lang="es-CO" sz="1100" dirty="0">
+                      <a:endParaRPr lang="es-CO" sz="1600" dirty="0">
                         <a:effectLst/>
                         <a:latin typeface="Calibri" panose="020F0502020204030204" pitchFamily="34" charset="0"/>
                         <a:ea typeface="Calibri" panose="020F0502020204030204" pitchFamily="34" charset="0"/>
@@ -11500,8 +11693,8 @@
         </p:nvSpPr>
         <p:spPr>
           <a:xfrm>
-            <a:off x="8347817" y="4772615"/>
-            <a:ext cx="982766" cy="369332"/>
+            <a:off x="8347816" y="4772615"/>
+            <a:ext cx="1462787" cy="369332"/>
           </a:xfrm>
           <a:prstGeom prst="rect">
             <a:avLst/>
@@ -11520,7 +11713,7 @@
                   <a:schemeClr val="bg1"/>
                 </a:solidFill>
               </a:rPr>
-              <a:t>Original</a:t>
+              <a:t>Aumentado</a:t>
             </a:r>
           </a:p>
         </p:txBody>
@@ -11752,7 +11945,7 @@
         </p:nvSpPr>
         <p:spPr>
           <a:xfrm>
-            <a:off x="5205518" y="3743579"/>
+            <a:off x="5243072" y="3713018"/>
             <a:ext cx="750912" cy="286284"/>
           </a:xfrm>
           <a:prstGeom prst="rightArrow">
@@ -11813,8 +12006,8 @@
         </p:blipFill>
         <p:spPr bwMode="auto">
           <a:xfrm>
-            <a:off x="870872" y="2724202"/>
-            <a:ext cx="3989673" cy="2675163"/>
+            <a:off x="458724" y="2724202"/>
+            <a:ext cx="4675060" cy="3134730"/>
           </a:xfrm>
           <a:prstGeom prst="rect">
             <a:avLst/>
@@ -11847,8 +12040,8 @@
         </p:blipFill>
         <p:spPr>
           <a:xfrm>
-            <a:off x="6421045" y="2724202"/>
-            <a:ext cx="5072455" cy="2486497"/>
+            <a:off x="6202862" y="2431937"/>
+            <a:ext cx="5364540" cy="3134729"/>
           </a:xfrm>
           <a:prstGeom prst="rect">
             <a:avLst/>
@@ -12037,14 +12230,14 @@
           <p:nvPr>
             <p:extLst>
               <p:ext uri="{D42A27DB-BD31-4B8C-83A1-F6EECF244321}">
-                <p14:modId xmlns:p14="http://schemas.microsoft.com/office/powerpoint/2010/main" val="3694696201"/>
+                <p14:modId xmlns:p14="http://schemas.microsoft.com/office/powerpoint/2010/main" val="2362275772"/>
               </p:ext>
             </p:extLst>
           </p:nvPr>
         </p:nvGraphicFramePr>
         <p:xfrm>
-          <a:off x="1028700" y="2629464"/>
-          <a:ext cx="4101270" cy="834648"/>
+          <a:off x="1028700" y="2474467"/>
+          <a:ext cx="4101270" cy="896225"/>
         </p:xfrm>
         <a:graphic>
           <a:graphicData uri="http://schemas.openxmlformats.org/drawingml/2006/table">
@@ -12080,12 +12273,12 @@
                         </a:spcBef>
                       </a:pPr>
                       <a:r>
-                        <a:rPr lang="es-ES" sz="1200">
+                        <a:rPr lang="es-ES" sz="1400">
                           <a:effectLst/>
                         </a:rPr>
                         <a:t>Parámetros</a:t>
                       </a:r>
-                      <a:endParaRPr lang="es-CO" sz="1200">
+                      <a:endParaRPr lang="es-CO" sz="1400">
                         <a:effectLst/>
                         <a:latin typeface="Calibri" panose="020F0502020204030204" pitchFamily="34" charset="0"/>
                         <a:ea typeface="Calibri" panose="020F0502020204030204" pitchFamily="34" charset="0"/>
@@ -12093,7 +12286,7 @@
                       </a:endParaRPr>
                     </a:p>
                   </a:txBody>
-                  <a:tcPr marL="68580" marR="68580" marT="0" marB="0"/>
+                  <a:tcPr marL="68580" marR="68580" marT="0" marB="0" anchor="ctr"/>
                 </a:tc>
                 <a:tc>
                   <a:txBody>
@@ -12106,12 +12299,12 @@
                         </a:spcBef>
                       </a:pPr>
                       <a:r>
-                        <a:rPr lang="es-ES" sz="1200" dirty="0">
+                        <a:rPr lang="es-ES" sz="1400" dirty="0">
                           <a:effectLst/>
                         </a:rPr>
                         <a:t>Parámetros propuestos</a:t>
                       </a:r>
-                      <a:endParaRPr lang="es-CO" sz="1200" dirty="0">
+                      <a:endParaRPr lang="es-CO" sz="1400" dirty="0">
                         <a:effectLst/>
                         <a:latin typeface="Calibri" panose="020F0502020204030204" pitchFamily="34" charset="0"/>
                         <a:ea typeface="Calibri" panose="020F0502020204030204" pitchFamily="34" charset="0"/>
@@ -12119,7 +12312,7 @@
                       </a:endParaRPr>
                     </a:p>
                   </a:txBody>
-                  <a:tcPr marL="68580" marR="68580" marT="0" marB="0"/>
+                  <a:tcPr marL="68580" marR="68580" marT="0" marB="0" anchor="ctr"/>
                 </a:tc>
                 <a:extLst>
                   <a:ext uri="{0D108BD9-81ED-4DB2-BD59-A6C34878D82A}">
@@ -12139,12 +12332,12 @@
                         </a:spcBef>
                       </a:pPr>
                       <a:r>
-                        <a:rPr lang="es-ES" sz="1200">
+                        <a:rPr lang="es-ES" sz="1400">
                           <a:effectLst/>
                         </a:rPr>
                         <a:t>Solucionador</a:t>
                       </a:r>
-                      <a:endParaRPr lang="es-CO" sz="1200">
+                      <a:endParaRPr lang="es-CO" sz="1400">
                         <a:effectLst/>
                         <a:latin typeface="Calibri" panose="020F0502020204030204" pitchFamily="34" charset="0"/>
                         <a:ea typeface="Calibri" panose="020F0502020204030204" pitchFamily="34" charset="0"/>
@@ -12152,7 +12345,7 @@
                       </a:endParaRPr>
                     </a:p>
                   </a:txBody>
-                  <a:tcPr marL="68580" marR="68580" marT="0" marB="0"/>
+                  <a:tcPr marL="68580" marR="68580" marT="0" marB="0" anchor="ctr"/>
                 </a:tc>
                 <a:tc>
                   <a:txBody>
@@ -12165,36 +12358,36 @@
                         </a:spcBef>
                       </a:pPr>
                       <a:r>
-                        <a:rPr lang="es-ES" sz="1200" dirty="0">
+                        <a:rPr lang="es-ES" sz="1400" dirty="0">
                           <a:effectLst/>
                         </a:rPr>
                         <a:t>[</a:t>
                       </a:r>
                       <a:r>
-                        <a:rPr lang="es-ES" sz="1200" dirty="0" err="1">
+                        <a:rPr lang="es-ES" sz="1400" dirty="0" err="1">
                           <a:effectLst/>
                         </a:rPr>
                         <a:t>svd</a:t>
                       </a:r>
                       <a:r>
-                        <a:rPr lang="es-ES" sz="1200" dirty="0">
+                        <a:rPr lang="es-ES" sz="1400" dirty="0">
                           <a:effectLst/>
                         </a:rPr>
                         <a:t>, </a:t>
                       </a:r>
                       <a:r>
-                        <a:rPr lang="es-ES" sz="1200" dirty="0" err="1">
+                        <a:rPr lang="es-ES" sz="1400" dirty="0" err="1">
                           <a:effectLst/>
                         </a:rPr>
                         <a:t>lsqr</a:t>
                       </a:r>
                       <a:r>
-                        <a:rPr lang="es-ES" sz="1200" dirty="0">
+                        <a:rPr lang="es-ES" sz="1400" dirty="0">
                           <a:effectLst/>
                         </a:rPr>
                         <a:t>]</a:t>
                       </a:r>
-                      <a:endParaRPr lang="es-CO" sz="1200" dirty="0">
+                      <a:endParaRPr lang="es-CO" sz="1400" dirty="0">
                         <a:effectLst/>
                         <a:latin typeface="Calibri" panose="020F0502020204030204" pitchFamily="34" charset="0"/>
                         <a:ea typeface="Calibri" panose="020F0502020204030204" pitchFamily="34" charset="0"/>
@@ -12202,7 +12395,7 @@
                       </a:endParaRPr>
                     </a:p>
                   </a:txBody>
-                  <a:tcPr marL="68580" marR="68580" marT="0" marB="0"/>
+                  <a:tcPr marL="68580" marR="68580" marT="0" marB="0" anchor="ctr"/>
                 </a:tc>
                 <a:extLst>
                   <a:ext uri="{0D108BD9-81ED-4DB2-BD59-A6C34878D82A}">
@@ -12229,13 +12422,13 @@
           <p:nvPr>
             <p:extLst>
               <p:ext uri="{D42A27DB-BD31-4B8C-83A1-F6EECF244321}">
-                <p14:modId xmlns:p14="http://schemas.microsoft.com/office/powerpoint/2010/main" val="3047429313"/>
+                <p14:modId xmlns:p14="http://schemas.microsoft.com/office/powerpoint/2010/main" val="2735783060"/>
               </p:ext>
             </p:extLst>
           </p:nvPr>
         </p:nvGraphicFramePr>
         <p:xfrm>
-          <a:off x="6558981" y="2365907"/>
+          <a:off x="5989984" y="2432509"/>
           <a:ext cx="4934518" cy="1361761"/>
         </p:xfrm>
         <a:graphic>
@@ -12272,12 +12465,12 @@
                         </a:spcBef>
                       </a:pPr>
                       <a:r>
-                        <a:rPr lang="es-ES" sz="1200" dirty="0">
+                        <a:rPr lang="es-ES" sz="1400" dirty="0">
                           <a:effectLst/>
                         </a:rPr>
                         <a:t>Parámetros</a:t>
                       </a:r>
-                      <a:endParaRPr lang="es-CO" sz="1200" dirty="0">
+                      <a:endParaRPr lang="es-CO" sz="1400" dirty="0">
                         <a:effectLst/>
                         <a:latin typeface="Calibri" panose="020F0502020204030204" pitchFamily="34" charset="0"/>
                         <a:ea typeface="Calibri" panose="020F0502020204030204" pitchFamily="34" charset="0"/>
@@ -12298,12 +12491,12 @@
                         </a:spcBef>
                       </a:pPr>
                       <a:r>
-                        <a:rPr lang="es-ES" sz="1200" dirty="0">
+                        <a:rPr lang="es-ES" sz="1400" dirty="0">
                           <a:effectLst/>
                         </a:rPr>
                         <a:t>Parámetros propuestos</a:t>
                       </a:r>
-                      <a:endParaRPr lang="es-CO" sz="1200" dirty="0">
+                      <a:endParaRPr lang="es-CO" sz="1400" dirty="0">
                         <a:effectLst/>
                         <a:latin typeface="Calibri" panose="020F0502020204030204" pitchFamily="34" charset="0"/>
                         <a:ea typeface="Calibri" panose="020F0502020204030204" pitchFamily="34" charset="0"/>
@@ -12331,12 +12524,12 @@
                         </a:spcBef>
                       </a:pPr>
                       <a:r>
-                        <a:rPr lang="es-ES" sz="1200">
+                        <a:rPr lang="es-ES" sz="1400">
                           <a:effectLst/>
                         </a:rPr>
                         <a:t>Leaf size</a:t>
                       </a:r>
-                      <a:endParaRPr lang="es-CO" sz="1200">
+                      <a:endParaRPr lang="es-CO" sz="1400">
                         <a:effectLst/>
                         <a:latin typeface="Calibri" panose="020F0502020204030204" pitchFamily="34" charset="0"/>
                         <a:ea typeface="Calibri" panose="020F0502020204030204" pitchFamily="34" charset="0"/>
@@ -12357,12 +12550,12 @@
                         </a:spcBef>
                       </a:pPr>
                       <a:r>
-                        <a:rPr lang="es-ES" sz="1200">
+                        <a:rPr lang="es-ES" sz="1400">
                           <a:effectLst/>
                         </a:rPr>
                         <a:t>[1, 11, 21, 31, 41]</a:t>
                       </a:r>
-                      <a:endParaRPr lang="es-CO" sz="1200">
+                      <a:endParaRPr lang="es-CO" sz="1400">
                         <a:effectLst/>
                         <a:latin typeface="Calibri" panose="020F0502020204030204" pitchFamily="34" charset="0"/>
                         <a:ea typeface="Calibri" panose="020F0502020204030204" pitchFamily="34" charset="0"/>
@@ -12390,12 +12583,12 @@
                         </a:spcBef>
                       </a:pPr>
                       <a:r>
-                        <a:rPr lang="es-ES" sz="1200">
+                        <a:rPr lang="es-ES" sz="1400">
                           <a:effectLst/>
                         </a:rPr>
                         <a:t>K-vecinos</a:t>
                       </a:r>
-                      <a:endParaRPr lang="es-CO" sz="1200">
+                      <a:endParaRPr lang="es-CO" sz="1400">
                         <a:effectLst/>
                         <a:latin typeface="Calibri" panose="020F0502020204030204" pitchFamily="34" charset="0"/>
                         <a:ea typeface="Calibri" panose="020F0502020204030204" pitchFamily="34" charset="0"/>
@@ -12416,12 +12609,12 @@
                         </a:spcBef>
                       </a:pPr>
                       <a:r>
-                        <a:rPr lang="es-ES" sz="1200">
+                        <a:rPr lang="es-ES" sz="1400">
                           <a:effectLst/>
                         </a:rPr>
                         <a:t>[5, 13, 21, 29, 37]</a:t>
                       </a:r>
-                      <a:endParaRPr lang="es-CO" sz="1200">
+                      <a:endParaRPr lang="es-CO" sz="1400">
                         <a:effectLst/>
                         <a:latin typeface="Calibri" panose="020F0502020204030204" pitchFamily="34" charset="0"/>
                         <a:ea typeface="Calibri" panose="020F0502020204030204" pitchFamily="34" charset="0"/>
@@ -12449,12 +12642,12 @@
                         </a:spcBef>
                       </a:pPr>
                       <a:r>
-                        <a:rPr lang="es-ES" sz="1200">
+                        <a:rPr lang="es-ES" sz="1400">
                           <a:effectLst/>
                         </a:rPr>
                         <a:t>Tipo de distancia</a:t>
                       </a:r>
-                      <a:endParaRPr lang="es-CO" sz="1200">
+                      <a:endParaRPr lang="es-CO" sz="1400">
                         <a:effectLst/>
                         <a:latin typeface="Calibri" panose="020F0502020204030204" pitchFamily="34" charset="0"/>
                         <a:ea typeface="Calibri" panose="020F0502020204030204" pitchFamily="34" charset="0"/>
@@ -12475,12 +12668,12 @@
                         </a:spcBef>
                       </a:pPr>
                       <a:r>
-                        <a:rPr lang="es-ES" sz="1200" dirty="0">
+                        <a:rPr lang="es-ES" sz="1400" dirty="0">
                           <a:effectLst/>
                         </a:rPr>
                         <a:t>[Manhattan, Euclidiana]</a:t>
                       </a:r>
-                      <a:endParaRPr lang="es-CO" sz="1200" dirty="0">
+                      <a:endParaRPr lang="es-CO" sz="1400" dirty="0">
                         <a:effectLst/>
                         <a:latin typeface="Calibri" panose="020F0502020204030204" pitchFamily="34" charset="0"/>
                         <a:ea typeface="Calibri" panose="020F0502020204030204" pitchFamily="34" charset="0"/>
@@ -12621,14 +12814,14 @@
           <p:nvPr>
             <p:extLst>
               <p:ext uri="{D42A27DB-BD31-4B8C-83A1-F6EECF244321}">
-                <p14:modId xmlns:p14="http://schemas.microsoft.com/office/powerpoint/2010/main" val="943028621"/>
+                <p14:modId xmlns:p14="http://schemas.microsoft.com/office/powerpoint/2010/main" val="813453931"/>
               </p:ext>
             </p:extLst>
           </p:nvPr>
         </p:nvGraphicFramePr>
         <p:xfrm>
-          <a:off x="1028700" y="4275045"/>
-          <a:ext cx="4101270" cy="1695705"/>
+          <a:off x="1028700" y="4111920"/>
+          <a:ext cx="4101270" cy="1870863"/>
         </p:xfrm>
         <a:graphic>
           <a:graphicData uri="http://schemas.openxmlformats.org/drawingml/2006/table">
@@ -12664,12 +12857,12 @@
                         </a:spcBef>
                       </a:pPr>
                       <a:r>
-                        <a:rPr lang="es-ES" sz="1200" dirty="0">
+                        <a:rPr lang="es-ES" sz="1400" dirty="0">
                           <a:effectLst/>
                         </a:rPr>
                         <a:t>Parámetros</a:t>
                       </a:r>
-                      <a:endParaRPr lang="es-CO" sz="1200" dirty="0">
+                      <a:endParaRPr lang="es-CO" sz="1400" dirty="0">
                         <a:effectLst/>
                         <a:latin typeface="Calibri" panose="020F0502020204030204" pitchFamily="34" charset="0"/>
                         <a:ea typeface="Calibri" panose="020F0502020204030204" pitchFamily="34" charset="0"/>
@@ -12677,7 +12870,7 @@
                       </a:endParaRPr>
                     </a:p>
                   </a:txBody>
-                  <a:tcPr marL="68580" marR="68580" marT="0" marB="0"/>
+                  <a:tcPr marL="68580" marR="68580" marT="0" marB="0" anchor="ctr"/>
                 </a:tc>
                 <a:tc>
                   <a:txBody>
@@ -12690,12 +12883,12 @@
                         </a:spcBef>
                       </a:pPr>
                       <a:r>
-                        <a:rPr lang="es-ES" sz="1200">
+                        <a:rPr lang="es-ES" sz="1400">
                           <a:effectLst/>
                         </a:rPr>
                         <a:t>Parámetros propuestos</a:t>
                       </a:r>
-                      <a:endParaRPr lang="es-CO" sz="1200">
+                      <a:endParaRPr lang="es-CO" sz="1400">
                         <a:effectLst/>
                         <a:latin typeface="Calibri" panose="020F0502020204030204" pitchFamily="34" charset="0"/>
                         <a:ea typeface="Calibri" panose="020F0502020204030204" pitchFamily="34" charset="0"/>
@@ -12703,7 +12896,7 @@
                       </a:endParaRPr>
                     </a:p>
                   </a:txBody>
-                  <a:tcPr marL="68580" marR="68580" marT="0" marB="0"/>
+                  <a:tcPr marL="68580" marR="68580" marT="0" marB="0" anchor="ctr"/>
                 </a:tc>
                 <a:extLst>
                   <a:ext uri="{0D108BD9-81ED-4DB2-BD59-A6C34878D82A}">
@@ -12723,12 +12916,12 @@
                         </a:spcBef>
                       </a:pPr>
                       <a:r>
-                        <a:rPr lang="es-ES" sz="1200">
+                        <a:rPr lang="es-ES" sz="1400">
                           <a:effectLst/>
                         </a:rPr>
                         <a:t>Mínimo de divisiones</a:t>
                       </a:r>
-                      <a:endParaRPr lang="es-CO" sz="1200">
+                      <a:endParaRPr lang="es-CO" sz="1400">
                         <a:effectLst/>
                         <a:latin typeface="Calibri" panose="020F0502020204030204" pitchFamily="34" charset="0"/>
                         <a:ea typeface="Calibri" panose="020F0502020204030204" pitchFamily="34" charset="0"/>
@@ -12736,7 +12929,7 @@
                       </a:endParaRPr>
                     </a:p>
                   </a:txBody>
-                  <a:tcPr marL="68580" marR="68580" marT="0" marB="0"/>
+                  <a:tcPr marL="68580" marR="68580" marT="0" marB="0" anchor="ctr"/>
                 </a:tc>
                 <a:tc>
                   <a:txBody>
@@ -12749,12 +12942,12 @@
                         </a:spcBef>
                       </a:pPr>
                       <a:r>
-                        <a:rPr lang="es-ES" sz="1200">
+                        <a:rPr lang="es-ES" sz="1400">
                           <a:effectLst/>
                         </a:rPr>
                         <a:t>[2,5,10]</a:t>
                       </a:r>
-                      <a:endParaRPr lang="es-CO" sz="1200">
+                      <a:endParaRPr lang="es-CO" sz="1400">
                         <a:effectLst/>
                         <a:latin typeface="Calibri" panose="020F0502020204030204" pitchFamily="34" charset="0"/>
                         <a:ea typeface="Calibri" panose="020F0502020204030204" pitchFamily="34" charset="0"/>
@@ -12762,7 +12955,7 @@
                       </a:endParaRPr>
                     </a:p>
                   </a:txBody>
-                  <a:tcPr marL="68580" marR="68580" marT="0" marB="0"/>
+                  <a:tcPr marL="68580" marR="68580" marT="0" marB="0" anchor="ctr"/>
                 </a:tc>
                 <a:extLst>
                   <a:ext uri="{0D108BD9-81ED-4DB2-BD59-A6C34878D82A}">
@@ -12782,12 +12975,12 @@
                         </a:spcBef>
                       </a:pPr>
                       <a:r>
-                        <a:rPr lang="es-ES" sz="1200">
+                        <a:rPr lang="es-ES" sz="1400">
                           <a:effectLst/>
                         </a:rPr>
                         <a:t>Mínimo de hojas</a:t>
                       </a:r>
-                      <a:endParaRPr lang="es-CO" sz="1200">
+                      <a:endParaRPr lang="es-CO" sz="1400">
                         <a:effectLst/>
                         <a:latin typeface="Calibri" panose="020F0502020204030204" pitchFamily="34" charset="0"/>
                         <a:ea typeface="Calibri" panose="020F0502020204030204" pitchFamily="34" charset="0"/>
@@ -12795,7 +12988,7 @@
                       </a:endParaRPr>
                     </a:p>
                   </a:txBody>
-                  <a:tcPr marL="68580" marR="68580" marT="0" marB="0"/>
+                  <a:tcPr marL="68580" marR="68580" marT="0" marB="0" anchor="ctr"/>
                 </a:tc>
                 <a:tc>
                   <a:txBody>
@@ -12808,12 +13001,12 @@
                         </a:spcBef>
                       </a:pPr>
                       <a:r>
-                        <a:rPr lang="es-ES" sz="1200">
+                        <a:rPr lang="es-ES" sz="1400" dirty="0">
                           <a:effectLst/>
                         </a:rPr>
                         <a:t>[1,2,4]</a:t>
                       </a:r>
-                      <a:endParaRPr lang="es-CO" sz="1200">
+                      <a:endParaRPr lang="es-CO" sz="1400" dirty="0">
                         <a:effectLst/>
                         <a:latin typeface="Calibri" panose="020F0502020204030204" pitchFamily="34" charset="0"/>
                         <a:ea typeface="Calibri" panose="020F0502020204030204" pitchFamily="34" charset="0"/>
@@ -12821,7 +13014,7 @@
                       </a:endParaRPr>
                     </a:p>
                   </a:txBody>
-                  <a:tcPr marL="68580" marR="68580" marT="0" marB="0"/>
+                  <a:tcPr marL="68580" marR="68580" marT="0" marB="0" anchor="ctr"/>
                 </a:tc>
                 <a:extLst>
                   <a:ext uri="{0D108BD9-81ED-4DB2-BD59-A6C34878D82A}">
@@ -12841,12 +13034,12 @@
                         </a:spcBef>
                       </a:pPr>
                       <a:r>
-                        <a:rPr lang="es-ES" sz="1200">
+                        <a:rPr lang="es-ES" sz="1400">
                           <a:effectLst/>
                         </a:rPr>
                         <a:t>Bootstrap</a:t>
                       </a:r>
-                      <a:endParaRPr lang="es-CO" sz="1200">
+                      <a:endParaRPr lang="es-CO" sz="1400">
                         <a:effectLst/>
                         <a:latin typeface="Calibri" panose="020F0502020204030204" pitchFamily="34" charset="0"/>
                         <a:ea typeface="Calibri" panose="020F0502020204030204" pitchFamily="34" charset="0"/>
@@ -12854,7 +13047,7 @@
                       </a:endParaRPr>
                     </a:p>
                   </a:txBody>
-                  <a:tcPr marL="68580" marR="68580" marT="0" marB="0"/>
+                  <a:tcPr marL="68580" marR="68580" marT="0" marB="0" anchor="ctr"/>
                 </a:tc>
                 <a:tc>
                   <a:txBody>
@@ -12867,12 +13060,12 @@
                         </a:spcBef>
                       </a:pPr>
                       <a:r>
-                        <a:rPr lang="es-ES" sz="1200">
+                        <a:rPr lang="es-ES" sz="1400">
                           <a:effectLst/>
                         </a:rPr>
                         <a:t>[Falso, Verdadero]</a:t>
                       </a:r>
-                      <a:endParaRPr lang="es-CO" sz="1200">
+                      <a:endParaRPr lang="es-CO" sz="1400">
                         <a:effectLst/>
                         <a:latin typeface="Calibri" panose="020F0502020204030204" pitchFamily="34" charset="0"/>
                         <a:ea typeface="Calibri" panose="020F0502020204030204" pitchFamily="34" charset="0"/>
@@ -12880,7 +13073,7 @@
                       </a:endParaRPr>
                     </a:p>
                   </a:txBody>
-                  <a:tcPr marL="68580" marR="68580" marT="0" marB="0"/>
+                  <a:tcPr marL="68580" marR="68580" marT="0" marB="0" anchor="ctr"/>
                 </a:tc>
                 <a:extLst>
                   <a:ext uri="{0D108BD9-81ED-4DB2-BD59-A6C34878D82A}">
@@ -12900,12 +13093,12 @@
                         </a:spcBef>
                       </a:pPr>
                       <a:r>
-                        <a:rPr lang="es-ES" sz="1200">
+                        <a:rPr lang="es-ES" sz="1400">
                           <a:effectLst/>
                         </a:rPr>
                         <a:t>Máximo de variables</a:t>
                       </a:r>
-                      <a:endParaRPr lang="es-CO" sz="1200">
+                      <a:endParaRPr lang="es-CO" sz="1400">
                         <a:effectLst/>
                         <a:latin typeface="Calibri" panose="020F0502020204030204" pitchFamily="34" charset="0"/>
                         <a:ea typeface="Calibri" panose="020F0502020204030204" pitchFamily="34" charset="0"/>
@@ -12913,7 +13106,7 @@
                       </a:endParaRPr>
                     </a:p>
                   </a:txBody>
-                  <a:tcPr marL="68580" marR="68580" marT="0" marB="0"/>
+                  <a:tcPr marL="68580" marR="68580" marT="0" marB="0" anchor="ctr"/>
                 </a:tc>
                 <a:tc>
                   <a:txBody>
@@ -12926,12 +13119,12 @@
                         </a:spcBef>
                       </a:pPr>
                       <a:r>
-                        <a:rPr lang="es-ES" sz="1200" dirty="0">
+                        <a:rPr lang="es-ES" sz="1400" dirty="0">
                           <a:effectLst/>
                         </a:rPr>
                         <a:t>[Automático, raíz cuadrada]</a:t>
                       </a:r>
-                      <a:endParaRPr lang="es-CO" sz="1200" dirty="0">
+                      <a:endParaRPr lang="es-CO" sz="1400" dirty="0">
                         <a:effectLst/>
                         <a:latin typeface="Calibri" panose="020F0502020204030204" pitchFamily="34" charset="0"/>
                         <a:ea typeface="Calibri" panose="020F0502020204030204" pitchFamily="34" charset="0"/>
@@ -12939,7 +13132,7 @@
                       </a:endParaRPr>
                     </a:p>
                   </a:txBody>
-                  <a:tcPr marL="68580" marR="68580" marT="0" marB="0"/>
+                  <a:tcPr marL="68580" marR="68580" marT="0" marB="0" anchor="ctr"/>
                 </a:tc>
                 <a:extLst>
                   <a:ext uri="{0D108BD9-81ED-4DB2-BD59-A6C34878D82A}">
@@ -12966,14 +13159,14 @@
           <p:nvPr>
             <p:extLst>
               <p:ext uri="{D42A27DB-BD31-4B8C-83A1-F6EECF244321}">
-                <p14:modId xmlns:p14="http://schemas.microsoft.com/office/powerpoint/2010/main" val="780280267"/>
+                <p14:modId xmlns:p14="http://schemas.microsoft.com/office/powerpoint/2010/main" val="3195059467"/>
               </p:ext>
             </p:extLst>
           </p:nvPr>
         </p:nvGraphicFramePr>
         <p:xfrm>
-          <a:off x="6558981" y="4275046"/>
-          <a:ext cx="4934517" cy="1695704"/>
+          <a:off x="5989984" y="4126333"/>
+          <a:ext cx="5503515" cy="1773020"/>
         </p:xfrm>
         <a:graphic>
           <a:graphicData uri="http://schemas.openxmlformats.org/drawingml/2006/table">
@@ -12982,35 +13175,35 @@
                 <a:tableStyleId>{5C22544A-7EE6-4342-B048-85BDC9FD1C3A}</a:tableStyleId>
               </a:tblPr>
               <a:tblGrid>
-                <a:gridCol w="938305">
+                <a:gridCol w="1046501">
                   <a:extLst>
                     <a:ext uri="{9D8B030D-6E8A-4147-A177-3AD203B41FA5}">
                       <a16:colId xmlns:a16="http://schemas.microsoft.com/office/drawing/2014/main" val="306922269"/>
                     </a:ext>
                   </a:extLst>
                 </a:gridCol>
-                <a:gridCol w="938305">
+                <a:gridCol w="1046501">
                   <a:extLst>
                     <a:ext uri="{9D8B030D-6E8A-4147-A177-3AD203B41FA5}">
                       <a16:colId xmlns:a16="http://schemas.microsoft.com/office/drawing/2014/main" val="575489873"/>
                     </a:ext>
                   </a:extLst>
                 </a:gridCol>
-                <a:gridCol w="1063025">
+                <a:gridCol w="1185602">
                   <a:extLst>
                     <a:ext uri="{9D8B030D-6E8A-4147-A177-3AD203B41FA5}">
                       <a16:colId xmlns:a16="http://schemas.microsoft.com/office/drawing/2014/main" val="3369122540"/>
                     </a:ext>
                   </a:extLst>
                 </a:gridCol>
-                <a:gridCol w="1056577">
+                <a:gridCol w="1178410">
                   <a:extLst>
                     <a:ext uri="{9D8B030D-6E8A-4147-A177-3AD203B41FA5}">
                       <a16:colId xmlns:a16="http://schemas.microsoft.com/office/drawing/2014/main" val="2126728728"/>
                     </a:ext>
                   </a:extLst>
                 </a:gridCol>
-                <a:gridCol w="938305">
+                <a:gridCol w="1046501">
                   <a:extLst>
                     <a:ext uri="{9D8B030D-6E8A-4147-A177-3AD203B41FA5}">
                       <a16:colId xmlns:a16="http://schemas.microsoft.com/office/drawing/2014/main" val="3584592576"/>
@@ -13030,12 +13223,12 @@
                         </a:spcBef>
                       </a:pPr>
                       <a:r>
-                        <a:rPr lang="es-ES" sz="1200" dirty="0">
+                        <a:rPr lang="es-ES" sz="1400" dirty="0">
                           <a:effectLst/>
                         </a:rPr>
                         <a:t>Modelo</a:t>
                       </a:r>
-                      <a:endParaRPr lang="es-CO" sz="1200" dirty="0">
+                      <a:endParaRPr lang="es-CO" sz="1400" dirty="0">
                         <a:effectLst/>
                         <a:latin typeface="Calibri" panose="020F0502020204030204" pitchFamily="34" charset="0"/>
                         <a:ea typeface="Calibri" panose="020F0502020204030204" pitchFamily="34" charset="0"/>
@@ -13056,12 +13249,12 @@
                         </a:spcBef>
                       </a:pPr>
                       <a:r>
-                        <a:rPr lang="es-ES" sz="1200">
+                        <a:rPr lang="es-ES" sz="1400">
                           <a:effectLst/>
                         </a:rPr>
                         <a:t>Exactitud</a:t>
                       </a:r>
-                      <a:endParaRPr lang="es-CO" sz="1200">
+                      <a:endParaRPr lang="es-CO" sz="1400">
                         <a:effectLst/>
                         <a:latin typeface="Calibri" panose="020F0502020204030204" pitchFamily="34" charset="0"/>
                         <a:ea typeface="Calibri" panose="020F0502020204030204" pitchFamily="34" charset="0"/>
@@ -13082,12 +13275,12 @@
                         </a:spcBef>
                       </a:pPr>
                       <a:r>
-                        <a:rPr lang="es-ES" sz="1200">
+                        <a:rPr lang="es-ES" sz="1400">
                           <a:effectLst/>
                         </a:rPr>
                         <a:t>Parámetros</a:t>
                       </a:r>
-                      <a:endParaRPr lang="es-CO" sz="1200">
+                      <a:endParaRPr lang="es-CO" sz="1400">
                         <a:effectLst/>
                         <a:latin typeface="Calibri" panose="020F0502020204030204" pitchFamily="34" charset="0"/>
                         <a:ea typeface="Calibri" panose="020F0502020204030204" pitchFamily="34" charset="0"/>
@@ -13108,12 +13301,12 @@
                         </a:spcBef>
                       </a:pPr>
                       <a:r>
-                        <a:rPr lang="es-ES" sz="1200">
+                        <a:rPr lang="es-ES" sz="1400">
                           <a:effectLst/>
                         </a:rPr>
                         <a:t>Profundidad</a:t>
                       </a:r>
-                      <a:endParaRPr lang="es-CO" sz="1200">
+                      <a:endParaRPr lang="es-CO" sz="1400">
                         <a:effectLst/>
                         <a:latin typeface="Calibri" panose="020F0502020204030204" pitchFamily="34" charset="0"/>
                         <a:ea typeface="Calibri" panose="020F0502020204030204" pitchFamily="34" charset="0"/>
@@ -13134,12 +13327,12 @@
                         </a:spcBef>
                       </a:pPr>
                       <a:r>
-                        <a:rPr lang="es-ES" sz="1200">
+                        <a:rPr lang="es-ES" sz="1400" dirty="0">
                           <a:effectLst/>
                         </a:rPr>
                         <a:t>Tiempo (ms) por paso</a:t>
                       </a:r>
-                      <a:endParaRPr lang="es-CO" sz="1200">
+                      <a:endParaRPr lang="es-CO" sz="1400" dirty="0">
                         <a:effectLst/>
                         <a:latin typeface="Calibri" panose="020F0502020204030204" pitchFamily="34" charset="0"/>
                         <a:ea typeface="Calibri" panose="020F0502020204030204" pitchFamily="34" charset="0"/>
@@ -13167,12 +13360,12 @@
                         </a:spcBef>
                       </a:pPr>
                       <a:r>
-                        <a:rPr lang="es-ES" sz="1200">
+                        <a:rPr lang="es-ES" sz="1400">
                           <a:effectLst/>
                         </a:rPr>
                         <a:t>Vgg16</a:t>
                       </a:r>
-                      <a:endParaRPr lang="es-CO" sz="1200">
+                      <a:endParaRPr lang="es-CO" sz="1400">
                         <a:effectLst/>
                         <a:latin typeface="Calibri" panose="020F0502020204030204" pitchFamily="34" charset="0"/>
                         <a:ea typeface="Calibri" panose="020F0502020204030204" pitchFamily="34" charset="0"/>
@@ -13193,12 +13386,12 @@
                         </a:spcBef>
                       </a:pPr>
                       <a:r>
-                        <a:rPr lang="es-ES" sz="1200">
+                        <a:rPr lang="es-ES" sz="1400">
                           <a:effectLst/>
                         </a:rPr>
                         <a:t>90.1</a:t>
                       </a:r>
-                      <a:endParaRPr lang="es-CO" sz="1200">
+                      <a:endParaRPr lang="es-CO" sz="1400">
                         <a:effectLst/>
                         <a:latin typeface="Calibri" panose="020F0502020204030204" pitchFamily="34" charset="0"/>
                         <a:ea typeface="Calibri" panose="020F0502020204030204" pitchFamily="34" charset="0"/>
@@ -13219,12 +13412,12 @@
                         </a:spcBef>
                       </a:pPr>
                       <a:r>
-                        <a:rPr lang="es-ES" sz="1200">
+                        <a:rPr lang="es-ES" sz="1400">
                           <a:effectLst/>
                         </a:rPr>
                         <a:t>138.4 M</a:t>
                       </a:r>
-                      <a:endParaRPr lang="es-CO" sz="1200">
+                      <a:endParaRPr lang="es-CO" sz="1400">
                         <a:effectLst/>
                         <a:latin typeface="Calibri" panose="020F0502020204030204" pitchFamily="34" charset="0"/>
                         <a:ea typeface="Calibri" panose="020F0502020204030204" pitchFamily="34" charset="0"/>
@@ -13245,12 +13438,12 @@
                         </a:spcBef>
                       </a:pPr>
                       <a:r>
-                        <a:rPr lang="es-ES" sz="1200">
+                        <a:rPr lang="es-ES" sz="1400">
                           <a:effectLst/>
                         </a:rPr>
                         <a:t>16</a:t>
                       </a:r>
-                      <a:endParaRPr lang="es-CO" sz="1200">
+                      <a:endParaRPr lang="es-CO" sz="1400">
                         <a:effectLst/>
                         <a:latin typeface="Calibri" panose="020F0502020204030204" pitchFamily="34" charset="0"/>
                         <a:ea typeface="Calibri" panose="020F0502020204030204" pitchFamily="34" charset="0"/>
@@ -13271,12 +13464,12 @@
                         </a:spcBef>
                       </a:pPr>
                       <a:r>
-                        <a:rPr lang="es-ES" sz="1200">
+                        <a:rPr lang="es-ES" sz="1400">
                           <a:effectLst/>
                         </a:rPr>
                         <a:t>69.5</a:t>
                       </a:r>
-                      <a:endParaRPr lang="es-CO" sz="1200">
+                      <a:endParaRPr lang="es-CO" sz="1400">
                         <a:effectLst/>
                         <a:latin typeface="Calibri" panose="020F0502020204030204" pitchFamily="34" charset="0"/>
                         <a:ea typeface="Calibri" panose="020F0502020204030204" pitchFamily="34" charset="0"/>
@@ -13304,12 +13497,12 @@
                         </a:spcBef>
                       </a:pPr>
                       <a:r>
-                        <a:rPr lang="es-ES" sz="1200">
+                        <a:rPr lang="es-ES" sz="1400">
                           <a:effectLst/>
                         </a:rPr>
                         <a:t>ResNet50</a:t>
                       </a:r>
-                      <a:endParaRPr lang="es-CO" sz="1200">
+                      <a:endParaRPr lang="es-CO" sz="1400">
                         <a:effectLst/>
                         <a:latin typeface="Calibri" panose="020F0502020204030204" pitchFamily="34" charset="0"/>
                         <a:ea typeface="Calibri" panose="020F0502020204030204" pitchFamily="34" charset="0"/>
@@ -13330,12 +13523,12 @@
                         </a:spcBef>
                       </a:pPr>
                       <a:r>
-                        <a:rPr lang="es-ES" sz="1200">
+                        <a:rPr lang="es-ES" sz="1400">
                           <a:effectLst/>
                         </a:rPr>
                         <a:t>92.1</a:t>
                       </a:r>
-                      <a:endParaRPr lang="es-CO" sz="1200">
+                      <a:endParaRPr lang="es-CO" sz="1400">
                         <a:effectLst/>
                         <a:latin typeface="Calibri" panose="020F0502020204030204" pitchFamily="34" charset="0"/>
                         <a:ea typeface="Calibri" panose="020F0502020204030204" pitchFamily="34" charset="0"/>
@@ -13356,12 +13549,12 @@
                         </a:spcBef>
                       </a:pPr>
                       <a:r>
-                        <a:rPr lang="es-ES" sz="1200">
+                        <a:rPr lang="es-ES" sz="1400">
                           <a:effectLst/>
                         </a:rPr>
                         <a:t>25.6 M</a:t>
                       </a:r>
-                      <a:endParaRPr lang="es-CO" sz="1200">
+                      <a:endParaRPr lang="es-CO" sz="1400">
                         <a:effectLst/>
                         <a:latin typeface="Calibri" panose="020F0502020204030204" pitchFamily="34" charset="0"/>
                         <a:ea typeface="Calibri" panose="020F0502020204030204" pitchFamily="34" charset="0"/>
@@ -13382,12 +13575,12 @@
                         </a:spcBef>
                       </a:pPr>
                       <a:r>
-                        <a:rPr lang="es-ES" sz="1200">
+                        <a:rPr lang="es-ES" sz="1400">
                           <a:effectLst/>
                         </a:rPr>
                         <a:t>107</a:t>
                       </a:r>
-                      <a:endParaRPr lang="es-CO" sz="1200">
+                      <a:endParaRPr lang="es-CO" sz="1400">
                         <a:effectLst/>
                         <a:latin typeface="Calibri" panose="020F0502020204030204" pitchFamily="34" charset="0"/>
                         <a:ea typeface="Calibri" panose="020F0502020204030204" pitchFamily="34" charset="0"/>
@@ -13408,12 +13601,12 @@
                         </a:spcBef>
                       </a:pPr>
                       <a:r>
-                        <a:rPr lang="es-ES" sz="1200">
+                        <a:rPr lang="es-ES" sz="1400">
                           <a:effectLst/>
                         </a:rPr>
                         <a:t>58.2</a:t>
                       </a:r>
-                      <a:endParaRPr lang="es-CO" sz="1200">
+                      <a:endParaRPr lang="es-CO" sz="1400">
                         <a:effectLst/>
                         <a:latin typeface="Calibri" panose="020F0502020204030204" pitchFamily="34" charset="0"/>
                         <a:ea typeface="Calibri" panose="020F0502020204030204" pitchFamily="34" charset="0"/>
@@ -13441,12 +13634,12 @@
                         </a:spcBef>
                       </a:pPr>
                       <a:r>
-                        <a:rPr lang="es-ES" sz="1200">
+                        <a:rPr lang="es-ES" sz="1400">
                           <a:effectLst/>
                         </a:rPr>
                         <a:t>MobileNet</a:t>
                       </a:r>
-                      <a:endParaRPr lang="es-CO" sz="1200">
+                      <a:endParaRPr lang="es-CO" sz="1400">
                         <a:effectLst/>
                         <a:latin typeface="Calibri" panose="020F0502020204030204" pitchFamily="34" charset="0"/>
                         <a:ea typeface="Calibri" panose="020F0502020204030204" pitchFamily="34" charset="0"/>
@@ -13467,12 +13660,12 @@
                         </a:spcBef>
                       </a:pPr>
                       <a:r>
-                        <a:rPr lang="es-ES" sz="1200">
+                        <a:rPr lang="es-ES" sz="1400">
                           <a:effectLst/>
                         </a:rPr>
                         <a:t>89.5</a:t>
                       </a:r>
-                      <a:endParaRPr lang="es-CO" sz="1200">
+                      <a:endParaRPr lang="es-CO" sz="1400">
                         <a:effectLst/>
                         <a:latin typeface="Calibri" panose="020F0502020204030204" pitchFamily="34" charset="0"/>
                         <a:ea typeface="Calibri" panose="020F0502020204030204" pitchFamily="34" charset="0"/>
@@ -13493,12 +13686,12 @@
                         </a:spcBef>
                       </a:pPr>
                       <a:r>
-                        <a:rPr lang="es-ES" sz="1200">
+                        <a:rPr lang="es-ES" sz="1400">
                           <a:effectLst/>
                         </a:rPr>
                         <a:t>4.3 M</a:t>
                       </a:r>
-                      <a:endParaRPr lang="es-CO" sz="1200">
+                      <a:endParaRPr lang="es-CO" sz="1400">
                         <a:effectLst/>
                         <a:latin typeface="Calibri" panose="020F0502020204030204" pitchFamily="34" charset="0"/>
                         <a:ea typeface="Calibri" panose="020F0502020204030204" pitchFamily="34" charset="0"/>
@@ -13519,12 +13712,12 @@
                         </a:spcBef>
                       </a:pPr>
                       <a:r>
-                        <a:rPr lang="es-ES" sz="1200">
+                        <a:rPr lang="es-ES" sz="1400">
                           <a:effectLst/>
                         </a:rPr>
                         <a:t>55</a:t>
                       </a:r>
-                      <a:endParaRPr lang="es-CO" sz="1200">
+                      <a:endParaRPr lang="es-CO" sz="1400">
                         <a:effectLst/>
                         <a:latin typeface="Calibri" panose="020F0502020204030204" pitchFamily="34" charset="0"/>
                         <a:ea typeface="Calibri" panose="020F0502020204030204" pitchFamily="34" charset="0"/>
@@ -13545,12 +13738,12 @@
                         </a:spcBef>
                       </a:pPr>
                       <a:r>
-                        <a:rPr lang="es-ES" sz="1200" dirty="0">
+                        <a:rPr lang="es-ES" sz="1400" dirty="0">
                           <a:effectLst/>
                         </a:rPr>
                         <a:t>22.6</a:t>
                       </a:r>
-                      <a:endParaRPr lang="es-CO" sz="1200" dirty="0">
+                      <a:endParaRPr lang="es-CO" sz="1400" dirty="0">
                         <a:effectLst/>
                         <a:latin typeface="Calibri" panose="020F0502020204030204" pitchFamily="34" charset="0"/>
                         <a:ea typeface="Calibri" panose="020F0502020204030204" pitchFamily="34" charset="0"/>
@@ -13719,410 +13912,6 @@
           </a:p>
         </p:txBody>
       </p:sp>
-      <p:graphicFrame>
-        <p:nvGraphicFramePr>
-          <p:cNvPr id="5" name="Table 4">
-            <a:extLst>
-              <a:ext uri="{FF2B5EF4-FFF2-40B4-BE49-F238E27FC236}">
-                <a16:creationId xmlns:a16="http://schemas.microsoft.com/office/drawing/2014/main" id="{98713706-6841-44D2-A39D-CA12FCBCD4CC}"/>
-              </a:ext>
-            </a:extLst>
-          </p:cNvPr>
-          <p:cNvGraphicFramePr>
-            <a:graphicFrameLocks noGrp="1"/>
-          </p:cNvGraphicFramePr>
-          <p:nvPr>
-            <p:extLst>
-              <p:ext uri="{D42A27DB-BD31-4B8C-83A1-F6EECF244321}">
-                <p14:modId xmlns:p14="http://schemas.microsoft.com/office/powerpoint/2010/main" val="626038978"/>
-              </p:ext>
-            </p:extLst>
-          </p:nvPr>
-        </p:nvGraphicFramePr>
-        <p:xfrm>
-          <a:off x="5706427" y="3906323"/>
-          <a:ext cx="5873124" cy="365760"/>
-        </p:xfrm>
-        <a:graphic>
-          <a:graphicData uri="http://schemas.openxmlformats.org/drawingml/2006/table">
-            <a:tbl>
-              <a:tblPr firstRow="1" firstCol="1" bandRow="1">
-                <a:tableStyleId>{5202B0CA-FC54-4496-8BCA-5EF66A818D29}</a:tableStyleId>
-              </a:tblPr>
-              <a:tblGrid>
-                <a:gridCol w="1056323">
-                  <a:extLst>
-                    <a:ext uri="{9D8B030D-6E8A-4147-A177-3AD203B41FA5}">
-                      <a16:colId xmlns:a16="http://schemas.microsoft.com/office/drawing/2014/main" val="3559547507"/>
-                    </a:ext>
-                  </a:extLst>
-                </a:gridCol>
-                <a:gridCol w="923925">
-                  <a:extLst>
-                    <a:ext uri="{9D8B030D-6E8A-4147-A177-3AD203B41FA5}">
-                      <a16:colId xmlns:a16="http://schemas.microsoft.com/office/drawing/2014/main" val="3201924437"/>
-                    </a:ext>
-                  </a:extLst>
-                </a:gridCol>
-                <a:gridCol w="836295">
-                  <a:extLst>
-                    <a:ext uri="{9D8B030D-6E8A-4147-A177-3AD203B41FA5}">
-                      <a16:colId xmlns:a16="http://schemas.microsoft.com/office/drawing/2014/main" val="3199263796"/>
-                    </a:ext>
-                  </a:extLst>
-                </a:gridCol>
-                <a:gridCol w="922020">
-                  <a:extLst>
-                    <a:ext uri="{9D8B030D-6E8A-4147-A177-3AD203B41FA5}">
-                      <a16:colId xmlns:a16="http://schemas.microsoft.com/office/drawing/2014/main" val="2663109410"/>
-                    </a:ext>
-                  </a:extLst>
-                </a:gridCol>
-                <a:gridCol w="1022350">
-                  <a:extLst>
-                    <a:ext uri="{9D8B030D-6E8A-4147-A177-3AD203B41FA5}">
-                      <a16:colId xmlns:a16="http://schemas.microsoft.com/office/drawing/2014/main" val="2232781785"/>
-                    </a:ext>
-                  </a:extLst>
-                </a:gridCol>
-                <a:gridCol w="1112211">
-                  <a:extLst>
-                    <a:ext uri="{9D8B030D-6E8A-4147-A177-3AD203B41FA5}">
-                      <a16:colId xmlns:a16="http://schemas.microsoft.com/office/drawing/2014/main" val="1854058401"/>
-                    </a:ext>
-                  </a:extLst>
-                </a:gridCol>
-              </a:tblGrid>
-              <a:tr h="0">
-                <a:tc>
-                  <a:txBody>
-                    <a:bodyPr/>
-                    <a:lstStyle/>
-                    <a:p>
-                      <a:pPr algn="ctr">
-                        <a:spcBef>
-                          <a:spcPts val="600"/>
-                        </a:spcBef>
-                      </a:pPr>
-                      <a:r>
-                        <a:rPr lang="es-ES" sz="1200" dirty="0">
-                          <a:effectLst/>
-                        </a:rPr>
-                        <a:t>Sensibilidad</a:t>
-                      </a:r>
-                      <a:endParaRPr lang="es-CO" sz="1200" dirty="0">
-                        <a:effectLst/>
-                        <a:latin typeface="Calibri" panose="020F0502020204030204" pitchFamily="34" charset="0"/>
-                        <a:ea typeface="Calibri" panose="020F0502020204030204" pitchFamily="34" charset="0"/>
-                        <a:cs typeface="Times New Roman" panose="02020603050405020304" pitchFamily="18" charset="0"/>
-                      </a:endParaRPr>
-                    </a:p>
-                  </a:txBody>
-                  <a:tcPr marL="68580" marR="68580" marT="0" marB="0"/>
-                </a:tc>
-                <a:tc>
-                  <a:txBody>
-                    <a:bodyPr/>
-                    <a:lstStyle/>
-                    <a:p>
-                      <a:pPr algn="ctr">
-                        <a:spcBef>
-                          <a:spcPts val="600"/>
-                        </a:spcBef>
-                      </a:pPr>
-                      <a:r>
-                        <a:rPr lang="es-ES" sz="1200" dirty="0">
-                          <a:effectLst/>
-                        </a:rPr>
-                        <a:t>Precisión</a:t>
-                      </a:r>
-                      <a:endParaRPr lang="es-CO" sz="1200" dirty="0">
-                        <a:effectLst/>
-                        <a:latin typeface="Calibri" panose="020F0502020204030204" pitchFamily="34" charset="0"/>
-                        <a:ea typeface="Calibri" panose="020F0502020204030204" pitchFamily="34" charset="0"/>
-                        <a:cs typeface="Times New Roman" panose="02020603050405020304" pitchFamily="18" charset="0"/>
-                      </a:endParaRPr>
-                    </a:p>
-                  </a:txBody>
-                  <a:tcPr marL="68580" marR="68580" marT="0" marB="0"/>
-                </a:tc>
-                <a:tc>
-                  <a:txBody>
-                    <a:bodyPr/>
-                    <a:lstStyle/>
-                    <a:p>
-                      <a:pPr algn="ctr">
-                        <a:spcBef>
-                          <a:spcPts val="600"/>
-                        </a:spcBef>
-                      </a:pPr>
-                      <a:r>
-                        <a:rPr lang="es-ES" sz="1200">
-                          <a:effectLst/>
-                        </a:rPr>
-                        <a:t>F1</a:t>
-                      </a:r>
-                      <a:endParaRPr lang="es-CO" sz="1200">
-                        <a:effectLst/>
-                        <a:latin typeface="Calibri" panose="020F0502020204030204" pitchFamily="34" charset="0"/>
-                        <a:ea typeface="Calibri" panose="020F0502020204030204" pitchFamily="34" charset="0"/>
-                        <a:cs typeface="Times New Roman" panose="02020603050405020304" pitchFamily="18" charset="0"/>
-                      </a:endParaRPr>
-                    </a:p>
-                  </a:txBody>
-                  <a:tcPr marL="68580" marR="68580" marT="0" marB="0"/>
-                </a:tc>
-                <a:tc>
-                  <a:txBody>
-                    <a:bodyPr/>
-                    <a:lstStyle/>
-                    <a:p>
-                      <a:pPr algn="ctr">
-                        <a:spcBef>
-                          <a:spcPts val="600"/>
-                        </a:spcBef>
-                      </a:pPr>
-                      <a:r>
-                        <a:rPr lang="es-ES" sz="1200" dirty="0">
-                          <a:effectLst/>
-                        </a:rPr>
-                        <a:t>Exactitud</a:t>
-                      </a:r>
-                      <a:endParaRPr lang="es-CO" sz="1200" dirty="0">
-                        <a:effectLst/>
-                        <a:latin typeface="Calibri" panose="020F0502020204030204" pitchFamily="34" charset="0"/>
-                        <a:ea typeface="Calibri" panose="020F0502020204030204" pitchFamily="34" charset="0"/>
-                        <a:cs typeface="Times New Roman" panose="02020603050405020304" pitchFamily="18" charset="0"/>
-                      </a:endParaRPr>
-                    </a:p>
-                  </a:txBody>
-                  <a:tcPr marL="68580" marR="68580" marT="0" marB="0"/>
-                </a:tc>
-                <a:tc>
-                  <a:txBody>
-                    <a:bodyPr/>
-                    <a:lstStyle/>
-                    <a:p>
-                      <a:pPr algn="ctr">
-                        <a:spcBef>
-                          <a:spcPts val="600"/>
-                        </a:spcBef>
-                      </a:pPr>
-                      <a:r>
-                        <a:rPr lang="es-ES" sz="1200">
-                          <a:effectLst/>
-                        </a:rPr>
-                        <a:t>AUC</a:t>
-                      </a:r>
-                      <a:endParaRPr lang="es-CO" sz="1200">
-                        <a:effectLst/>
-                        <a:latin typeface="Calibri" panose="020F0502020204030204" pitchFamily="34" charset="0"/>
-                        <a:ea typeface="Calibri" panose="020F0502020204030204" pitchFamily="34" charset="0"/>
-                        <a:cs typeface="Times New Roman" panose="02020603050405020304" pitchFamily="18" charset="0"/>
-                      </a:endParaRPr>
-                    </a:p>
-                  </a:txBody>
-                  <a:tcPr marL="68580" marR="68580" marT="0" marB="0"/>
-                </a:tc>
-                <a:tc>
-                  <a:txBody>
-                    <a:bodyPr/>
-                    <a:lstStyle/>
-                    <a:p>
-                      <a:pPr algn="ctr">
-                        <a:spcBef>
-                          <a:spcPts val="600"/>
-                        </a:spcBef>
-                      </a:pPr>
-                      <a:r>
-                        <a:rPr lang="es-ES" sz="1200">
-                          <a:effectLst/>
-                        </a:rPr>
-                        <a:t>Especificidad</a:t>
-                      </a:r>
-                      <a:endParaRPr lang="es-CO" sz="1200">
-                        <a:effectLst/>
-                        <a:latin typeface="Calibri" panose="020F0502020204030204" pitchFamily="34" charset="0"/>
-                        <a:ea typeface="Calibri" panose="020F0502020204030204" pitchFamily="34" charset="0"/>
-                        <a:cs typeface="Times New Roman" panose="02020603050405020304" pitchFamily="18" charset="0"/>
-                      </a:endParaRPr>
-                    </a:p>
-                  </a:txBody>
-                  <a:tcPr marL="68580" marR="68580" marT="0" marB="0"/>
-                </a:tc>
-                <a:extLst>
-                  <a:ext uri="{0D108BD9-81ED-4DB2-BD59-A6C34878D82A}">
-                    <a16:rowId xmlns:a16="http://schemas.microsoft.com/office/drawing/2014/main" val="598518096"/>
-                  </a:ext>
-                </a:extLst>
-              </a:tr>
-              <a:tr h="0">
-                <a:tc>
-                  <a:txBody>
-                    <a:bodyPr/>
-                    <a:lstStyle/>
-                    <a:p>
-                      <a:pPr algn="ctr">
-                        <a:spcBef>
-                          <a:spcPts val="600"/>
-                        </a:spcBef>
-                      </a:pPr>
-                      <a:r>
-                        <a:rPr lang="es-ES" sz="1200" b="0" dirty="0">
-                          <a:effectLst/>
-                        </a:rPr>
-                        <a:t>0.945</a:t>
-                      </a:r>
-                      <a:endParaRPr lang="es-CO" sz="1200" b="0" dirty="0">
-                        <a:effectLst/>
-                        <a:latin typeface="Calibri" panose="020F0502020204030204" pitchFamily="34" charset="0"/>
-                        <a:ea typeface="+mn-ea"/>
-                        <a:cs typeface="Times New Roman" panose="02020603050405020304" pitchFamily="18" charset="0"/>
-                      </a:endParaRPr>
-                    </a:p>
-                  </a:txBody>
-                  <a:tcPr marL="68580" marR="68580" marT="0" marB="0"/>
-                </a:tc>
-                <a:tc>
-                  <a:txBody>
-                    <a:bodyPr/>
-                    <a:lstStyle/>
-                    <a:p>
-                      <a:pPr algn="ctr">
-                        <a:spcBef>
-                          <a:spcPts val="600"/>
-                        </a:spcBef>
-                      </a:pPr>
-                      <a:r>
-                        <a:rPr lang="es-ES" sz="1200" dirty="0">
-                          <a:effectLst/>
-                        </a:rPr>
-                        <a:t>0.945</a:t>
-                      </a:r>
-                      <a:endParaRPr lang="es-CO" sz="1200" dirty="0">
-                        <a:effectLst/>
-                        <a:latin typeface="Calibri" panose="020F0502020204030204" pitchFamily="34" charset="0"/>
-                        <a:ea typeface="Calibri" panose="020F0502020204030204" pitchFamily="34" charset="0"/>
-                        <a:cs typeface="Times New Roman" panose="02020603050405020304" pitchFamily="18" charset="0"/>
-                      </a:endParaRPr>
-                    </a:p>
-                  </a:txBody>
-                  <a:tcPr marL="68580" marR="68580" marT="0" marB="0"/>
-                </a:tc>
-                <a:tc>
-                  <a:txBody>
-                    <a:bodyPr/>
-                    <a:lstStyle/>
-                    <a:p>
-                      <a:pPr algn="ctr">
-                        <a:spcBef>
-                          <a:spcPts val="600"/>
-                        </a:spcBef>
-                      </a:pPr>
-                      <a:r>
-                        <a:rPr lang="es-ES" sz="1200">
-                          <a:effectLst/>
-                        </a:rPr>
-                        <a:t>0.945</a:t>
-                      </a:r>
-                      <a:endParaRPr lang="es-CO" sz="1200">
-                        <a:effectLst/>
-                        <a:latin typeface="Calibri" panose="020F0502020204030204" pitchFamily="34" charset="0"/>
-                        <a:ea typeface="Calibri" panose="020F0502020204030204" pitchFamily="34" charset="0"/>
-                        <a:cs typeface="Times New Roman" panose="02020603050405020304" pitchFamily="18" charset="0"/>
-                      </a:endParaRPr>
-                    </a:p>
-                  </a:txBody>
-                  <a:tcPr marL="68580" marR="68580" marT="0" marB="0"/>
-                </a:tc>
-                <a:tc>
-                  <a:txBody>
-                    <a:bodyPr/>
-                    <a:lstStyle/>
-                    <a:p>
-                      <a:pPr algn="ctr">
-                        <a:spcBef>
-                          <a:spcPts val="600"/>
-                        </a:spcBef>
-                      </a:pPr>
-                      <a:r>
-                        <a:rPr lang="es-ES" sz="1200">
-                          <a:effectLst/>
-                        </a:rPr>
-                        <a:t>0.945</a:t>
-                      </a:r>
-                      <a:endParaRPr lang="es-CO" sz="1200">
-                        <a:effectLst/>
-                        <a:latin typeface="Calibri" panose="020F0502020204030204" pitchFamily="34" charset="0"/>
-                        <a:ea typeface="Calibri" panose="020F0502020204030204" pitchFamily="34" charset="0"/>
-                        <a:cs typeface="Times New Roman" panose="02020603050405020304" pitchFamily="18" charset="0"/>
-                      </a:endParaRPr>
-                    </a:p>
-                  </a:txBody>
-                  <a:tcPr marL="68580" marR="68580" marT="0" marB="0"/>
-                </a:tc>
-                <a:tc>
-                  <a:txBody>
-                    <a:bodyPr/>
-                    <a:lstStyle/>
-                    <a:p>
-                      <a:pPr algn="ctr">
-                        <a:spcBef>
-                          <a:spcPts val="600"/>
-                        </a:spcBef>
-                      </a:pPr>
-                      <a:r>
-                        <a:rPr lang="es-ES" sz="1200">
-                          <a:effectLst/>
-                        </a:rPr>
-                        <a:t>0.972</a:t>
-                      </a:r>
-                      <a:endParaRPr lang="es-CO" sz="1200">
-                        <a:effectLst/>
-                        <a:latin typeface="Calibri" panose="020F0502020204030204" pitchFamily="34" charset="0"/>
-                        <a:ea typeface="Calibri" panose="020F0502020204030204" pitchFamily="34" charset="0"/>
-                        <a:cs typeface="Times New Roman" panose="02020603050405020304" pitchFamily="18" charset="0"/>
-                      </a:endParaRPr>
-                    </a:p>
-                  </a:txBody>
-                  <a:tcPr marL="68580" marR="68580" marT="0" marB="0"/>
-                </a:tc>
-                <a:tc>
-                  <a:txBody>
-                    <a:bodyPr/>
-                    <a:lstStyle/>
-                    <a:p>
-                      <a:pPr algn="ctr">
-                        <a:spcBef>
-                          <a:spcPts val="600"/>
-                        </a:spcBef>
-                      </a:pPr>
-                      <a:r>
-                        <a:rPr lang="es-ES" sz="1200" dirty="0">
-                          <a:effectLst/>
-                        </a:rPr>
-                        <a:t>0.972</a:t>
-                      </a:r>
-                      <a:endParaRPr lang="es-CO" sz="1200" dirty="0">
-                        <a:effectLst/>
-                        <a:latin typeface="Calibri" panose="020F0502020204030204" pitchFamily="34" charset="0"/>
-                        <a:ea typeface="Calibri" panose="020F0502020204030204" pitchFamily="34" charset="0"/>
-                        <a:cs typeface="Times New Roman" panose="02020603050405020304" pitchFamily="18" charset="0"/>
-                      </a:endParaRPr>
-                    </a:p>
-                  </a:txBody>
-                  <a:tcPr marL="68580" marR="68580" marT="0" marB="0"/>
-                </a:tc>
-                <a:extLst>
-                  <a:ext uri="{0D108BD9-81ED-4DB2-BD59-A6C34878D82A}">
-                    <a16:rowId xmlns:a16="http://schemas.microsoft.com/office/drawing/2014/main" val="4147197331"/>
-                  </a:ext>
-                </a:extLst>
-              </a:tr>
-            </a:tbl>
-          </a:graphicData>
-        </a:graphic>
-      </p:graphicFrame>
       <p:pic>
         <p:nvPicPr>
           <p:cNvPr id="12" name="Picture 11" descr="Chart, treemap chart&#10;&#10;Description automatically generated">
@@ -14145,14 +13934,550 @@
         </p:blipFill>
         <p:spPr>
           <a:xfrm>
-            <a:off x="1028700" y="2441961"/>
-            <a:ext cx="3979135" cy="3649425"/>
+            <a:off x="1404730" y="2172661"/>
+            <a:ext cx="4691270" cy="4302553"/>
           </a:xfrm>
           <a:prstGeom prst="rect">
             <a:avLst/>
           </a:prstGeom>
         </p:spPr>
       </p:pic>
+      <p:graphicFrame>
+        <p:nvGraphicFramePr>
+          <p:cNvPr id="2" name="Table 2">
+            <a:extLst>
+              <a:ext uri="{FF2B5EF4-FFF2-40B4-BE49-F238E27FC236}">
+                <a16:creationId xmlns:a16="http://schemas.microsoft.com/office/drawing/2014/main" id="{5C33ECE0-22EC-413E-8E2A-1327237BE943}"/>
+              </a:ext>
+            </a:extLst>
+          </p:cNvPr>
+          <p:cNvGraphicFramePr>
+            <a:graphicFrameLocks noGrp="1"/>
+          </p:cNvGraphicFramePr>
+          <p:nvPr>
+            <p:extLst>
+              <p:ext uri="{D42A27DB-BD31-4B8C-83A1-F6EECF244321}">
+                <p14:modId xmlns:p14="http://schemas.microsoft.com/office/powerpoint/2010/main" val="424759126"/>
+              </p:ext>
+            </p:extLst>
+          </p:nvPr>
+        </p:nvGraphicFramePr>
+        <p:xfrm>
+          <a:off x="7210700" y="2870170"/>
+          <a:ext cx="3256999" cy="2194560"/>
+        </p:xfrm>
+        <a:graphic>
+          <a:graphicData uri="http://schemas.openxmlformats.org/drawingml/2006/table">
+            <a:tbl>
+              <a:tblPr firstRow="1" bandRow="1">
+                <a:tableStyleId>{5C22544A-7EE6-4342-B048-85BDC9FD1C3A}</a:tableStyleId>
+              </a:tblPr>
+              <a:tblGrid>
+                <a:gridCol w="1689653">
+                  <a:extLst>
+                    <a:ext uri="{9D8B030D-6E8A-4147-A177-3AD203B41FA5}">
+                      <a16:colId xmlns:a16="http://schemas.microsoft.com/office/drawing/2014/main" val="2300131777"/>
+                    </a:ext>
+                  </a:extLst>
+                </a:gridCol>
+                <a:gridCol w="1567346">
+                  <a:extLst>
+                    <a:ext uri="{9D8B030D-6E8A-4147-A177-3AD203B41FA5}">
+                      <a16:colId xmlns:a16="http://schemas.microsoft.com/office/drawing/2014/main" val="1477300347"/>
+                    </a:ext>
+                  </a:extLst>
+                </a:gridCol>
+              </a:tblGrid>
+              <a:tr h="360000">
+                <a:tc>
+                  <a:txBody>
+                    <a:bodyPr/>
+                    <a:lstStyle/>
+                    <a:p>
+                      <a:pPr marL="0" marR="0" lvl="0" indent="0" algn="l" defTabSz="914400" rtl="0" eaLnBrk="1" fontAlgn="auto" latinLnBrk="0" hangingPunct="1">
+                        <a:lnSpc>
+                          <a:spcPct val="100000"/>
+                        </a:lnSpc>
+                        <a:spcBef>
+                          <a:spcPts val="0"/>
+                        </a:spcBef>
+                        <a:spcAft>
+                          <a:spcPts val="0"/>
+                        </a:spcAft>
+                        <a:buClrTx/>
+                        <a:buSzTx/>
+                        <a:buFontTx/>
+                        <a:buNone/>
+                        <a:tabLst/>
+                        <a:defRPr/>
+                      </a:pPr>
+                      <a:r>
+                        <a:rPr lang="es-ES" sz="1800" dirty="0">
+                          <a:effectLst/>
+                        </a:rPr>
+                        <a:t>Sensibilidad</a:t>
+                      </a:r>
+                      <a:endParaRPr lang="es-CO" sz="1800" dirty="0">
+                        <a:effectLst/>
+                        <a:latin typeface="Calibri" panose="020F0502020204030204" pitchFamily="34" charset="0"/>
+                        <a:ea typeface="Calibri" panose="020F0502020204030204" pitchFamily="34" charset="0"/>
+                        <a:cs typeface="Times New Roman" panose="02020603050405020304" pitchFamily="18" charset="0"/>
+                      </a:endParaRPr>
+                    </a:p>
+                  </a:txBody>
+                  <a:tcPr/>
+                </a:tc>
+                <a:tc>
+                  <a:txBody>
+                    <a:bodyPr/>
+                    <a:lstStyle/>
+                    <a:p>
+                      <a:pPr marL="0" marR="0" lvl="0" indent="0" algn="l" defTabSz="914400" rtl="0" eaLnBrk="1" fontAlgn="auto" latinLnBrk="0" hangingPunct="1">
+                        <a:lnSpc>
+                          <a:spcPct val="100000"/>
+                        </a:lnSpc>
+                        <a:spcBef>
+                          <a:spcPts val="0"/>
+                        </a:spcBef>
+                        <a:spcAft>
+                          <a:spcPts val="0"/>
+                        </a:spcAft>
+                        <a:buClrTx/>
+                        <a:buSzTx/>
+                        <a:buFontTx/>
+                        <a:buNone/>
+                        <a:tabLst/>
+                        <a:defRPr/>
+                      </a:pPr>
+                      <a:r>
+                        <a:rPr lang="es-ES" sz="1800" b="0" dirty="0">
+                          <a:effectLst/>
+                        </a:rPr>
+                        <a:t>0.945</a:t>
+                      </a:r>
+                      <a:endParaRPr lang="es-CO" sz="1800" b="0" dirty="0">
+                        <a:effectLst/>
+                        <a:latin typeface="Calibri" panose="020F0502020204030204" pitchFamily="34" charset="0"/>
+                        <a:ea typeface="+mn-ea"/>
+                        <a:cs typeface="Times New Roman" panose="02020603050405020304" pitchFamily="18" charset="0"/>
+                      </a:endParaRPr>
+                    </a:p>
+                  </a:txBody>
+                  <a:tcPr/>
+                </a:tc>
+                <a:extLst>
+                  <a:ext uri="{0D108BD9-81ED-4DB2-BD59-A6C34878D82A}">
+                    <a16:rowId xmlns:a16="http://schemas.microsoft.com/office/drawing/2014/main" val="750535927"/>
+                  </a:ext>
+                </a:extLst>
+              </a:tr>
+              <a:tr h="360000">
+                <a:tc>
+                  <a:txBody>
+                    <a:bodyPr/>
+                    <a:lstStyle/>
+                    <a:p>
+                      <a:pPr marL="0" marR="0" lvl="0" indent="0" algn="l" defTabSz="914400" rtl="0" eaLnBrk="1" fontAlgn="auto" latinLnBrk="0" hangingPunct="1">
+                        <a:lnSpc>
+                          <a:spcPct val="100000"/>
+                        </a:lnSpc>
+                        <a:spcBef>
+                          <a:spcPts val="0"/>
+                        </a:spcBef>
+                        <a:spcAft>
+                          <a:spcPts val="0"/>
+                        </a:spcAft>
+                        <a:buClrTx/>
+                        <a:buSzTx/>
+                        <a:buFontTx/>
+                        <a:buNone/>
+                        <a:tabLst/>
+                        <a:defRPr/>
+                      </a:pPr>
+                      <a:r>
+                        <a:rPr lang="es-ES" sz="1800" dirty="0">
+                          <a:effectLst/>
+                        </a:rPr>
+                        <a:t>Precisión</a:t>
+                      </a:r>
+                      <a:endParaRPr lang="es-CO" sz="1800" dirty="0">
+                        <a:effectLst/>
+                        <a:latin typeface="Calibri" panose="020F0502020204030204" pitchFamily="34" charset="0"/>
+                        <a:ea typeface="Calibri" panose="020F0502020204030204" pitchFamily="34" charset="0"/>
+                        <a:cs typeface="Times New Roman" panose="02020603050405020304" pitchFamily="18" charset="0"/>
+                      </a:endParaRPr>
+                    </a:p>
+                  </a:txBody>
+                  <a:tcPr/>
+                </a:tc>
+                <a:tc>
+                  <a:txBody>
+                    <a:bodyPr/>
+                    <a:lstStyle/>
+                    <a:p>
+                      <a:pPr marL="0" marR="0" lvl="0" indent="0" algn="l" defTabSz="914400" rtl="0" eaLnBrk="1" fontAlgn="auto" latinLnBrk="0" hangingPunct="1">
+                        <a:lnSpc>
+                          <a:spcPct val="100000"/>
+                        </a:lnSpc>
+                        <a:spcBef>
+                          <a:spcPts val="0"/>
+                        </a:spcBef>
+                        <a:spcAft>
+                          <a:spcPts val="0"/>
+                        </a:spcAft>
+                        <a:buClrTx/>
+                        <a:buSzTx/>
+                        <a:buFontTx/>
+                        <a:buNone/>
+                        <a:tabLst/>
+                        <a:defRPr/>
+                      </a:pPr>
+                      <a:r>
+                        <a:rPr lang="es-ES" sz="1800" dirty="0">
+                          <a:effectLst/>
+                        </a:rPr>
+                        <a:t>0.945</a:t>
+                      </a:r>
+                      <a:endParaRPr lang="es-CO" sz="1800" dirty="0">
+                        <a:effectLst/>
+                        <a:latin typeface="Calibri" panose="020F0502020204030204" pitchFamily="34" charset="0"/>
+                        <a:ea typeface="Calibri" panose="020F0502020204030204" pitchFamily="34" charset="0"/>
+                        <a:cs typeface="Times New Roman" panose="02020603050405020304" pitchFamily="18" charset="0"/>
+                      </a:endParaRPr>
+                    </a:p>
+                  </a:txBody>
+                  <a:tcPr/>
+                </a:tc>
+                <a:extLst>
+                  <a:ext uri="{0D108BD9-81ED-4DB2-BD59-A6C34878D82A}">
+                    <a16:rowId xmlns:a16="http://schemas.microsoft.com/office/drawing/2014/main" val="556949355"/>
+                  </a:ext>
+                </a:extLst>
+              </a:tr>
+              <a:tr h="360000">
+                <a:tc>
+                  <a:txBody>
+                    <a:bodyPr/>
+                    <a:lstStyle/>
+                    <a:p>
+                      <a:pPr marL="0" marR="0" lvl="0" indent="0" algn="l" defTabSz="914400" rtl="0" eaLnBrk="1" fontAlgn="auto" latinLnBrk="0" hangingPunct="1">
+                        <a:lnSpc>
+                          <a:spcPct val="100000"/>
+                        </a:lnSpc>
+                        <a:spcBef>
+                          <a:spcPts val="0"/>
+                        </a:spcBef>
+                        <a:spcAft>
+                          <a:spcPts val="0"/>
+                        </a:spcAft>
+                        <a:buClrTx/>
+                        <a:buSzTx/>
+                        <a:buFontTx/>
+                        <a:buNone/>
+                        <a:tabLst/>
+                        <a:defRPr/>
+                      </a:pPr>
+                      <a:r>
+                        <a:rPr lang="es-ES" sz="1800" dirty="0">
+                          <a:effectLst/>
+                        </a:rPr>
+                        <a:t>F1</a:t>
+                      </a:r>
+                      <a:endParaRPr lang="es-CO" sz="1800" dirty="0">
+                        <a:effectLst/>
+                        <a:latin typeface="Calibri" panose="020F0502020204030204" pitchFamily="34" charset="0"/>
+                        <a:ea typeface="Calibri" panose="020F0502020204030204" pitchFamily="34" charset="0"/>
+                        <a:cs typeface="Times New Roman" panose="02020603050405020304" pitchFamily="18" charset="0"/>
+                      </a:endParaRPr>
+                    </a:p>
+                  </a:txBody>
+                  <a:tcPr/>
+                </a:tc>
+                <a:tc>
+                  <a:txBody>
+                    <a:bodyPr/>
+                    <a:lstStyle/>
+                    <a:p>
+                      <a:pPr marL="0" marR="0" lvl="0" indent="0" algn="l" defTabSz="914400" rtl="0" eaLnBrk="1" fontAlgn="auto" latinLnBrk="0" hangingPunct="1">
+                        <a:lnSpc>
+                          <a:spcPct val="100000"/>
+                        </a:lnSpc>
+                        <a:spcBef>
+                          <a:spcPts val="0"/>
+                        </a:spcBef>
+                        <a:spcAft>
+                          <a:spcPts val="0"/>
+                        </a:spcAft>
+                        <a:buClrTx/>
+                        <a:buSzTx/>
+                        <a:buFontTx/>
+                        <a:buNone/>
+                        <a:tabLst/>
+                        <a:defRPr/>
+                      </a:pPr>
+                      <a:r>
+                        <a:rPr lang="es-ES" sz="1800" dirty="0">
+                          <a:effectLst/>
+                        </a:rPr>
+                        <a:t>0.945</a:t>
+                      </a:r>
+                      <a:endParaRPr lang="es-CO" sz="1800" dirty="0">
+                        <a:effectLst/>
+                        <a:latin typeface="Calibri" panose="020F0502020204030204" pitchFamily="34" charset="0"/>
+                        <a:ea typeface="Calibri" panose="020F0502020204030204" pitchFamily="34" charset="0"/>
+                        <a:cs typeface="Times New Roman" panose="02020603050405020304" pitchFamily="18" charset="0"/>
+                      </a:endParaRPr>
+                    </a:p>
+                  </a:txBody>
+                  <a:tcPr/>
+                </a:tc>
+                <a:extLst>
+                  <a:ext uri="{0D108BD9-81ED-4DB2-BD59-A6C34878D82A}">
+                    <a16:rowId xmlns:a16="http://schemas.microsoft.com/office/drawing/2014/main" val="560068297"/>
+                  </a:ext>
+                </a:extLst>
+              </a:tr>
+              <a:tr h="360000">
+                <a:tc>
+                  <a:txBody>
+                    <a:bodyPr/>
+                    <a:lstStyle/>
+                    <a:p>
+                      <a:pPr marL="0" marR="0" lvl="0" indent="0" algn="l" defTabSz="914400" rtl="0" eaLnBrk="1" fontAlgn="auto" latinLnBrk="0" hangingPunct="1">
+                        <a:lnSpc>
+                          <a:spcPct val="100000"/>
+                        </a:lnSpc>
+                        <a:spcBef>
+                          <a:spcPts val="0"/>
+                        </a:spcBef>
+                        <a:spcAft>
+                          <a:spcPts val="0"/>
+                        </a:spcAft>
+                        <a:buClrTx/>
+                        <a:buSzTx/>
+                        <a:buFontTx/>
+                        <a:buNone/>
+                        <a:tabLst/>
+                        <a:defRPr/>
+                      </a:pPr>
+                      <a:r>
+                        <a:rPr lang="es-ES" sz="1800" dirty="0">
+                          <a:effectLst/>
+                        </a:rPr>
+                        <a:t>Exactitud</a:t>
+                      </a:r>
+                      <a:endParaRPr lang="es-CO" sz="1800" dirty="0">
+                        <a:effectLst/>
+                        <a:latin typeface="Calibri" panose="020F0502020204030204" pitchFamily="34" charset="0"/>
+                        <a:ea typeface="Calibri" panose="020F0502020204030204" pitchFamily="34" charset="0"/>
+                        <a:cs typeface="Times New Roman" panose="02020603050405020304" pitchFamily="18" charset="0"/>
+                      </a:endParaRPr>
+                    </a:p>
+                  </a:txBody>
+                  <a:tcPr/>
+                </a:tc>
+                <a:tc>
+                  <a:txBody>
+                    <a:bodyPr/>
+                    <a:lstStyle/>
+                    <a:p>
+                      <a:pPr marL="0" marR="0" lvl="0" indent="0" algn="l" defTabSz="914400" rtl="0" eaLnBrk="1" fontAlgn="auto" latinLnBrk="0" hangingPunct="1">
+                        <a:lnSpc>
+                          <a:spcPct val="100000"/>
+                        </a:lnSpc>
+                        <a:spcBef>
+                          <a:spcPts val="0"/>
+                        </a:spcBef>
+                        <a:spcAft>
+                          <a:spcPts val="0"/>
+                        </a:spcAft>
+                        <a:buClrTx/>
+                        <a:buSzTx/>
+                        <a:buFontTx/>
+                        <a:buNone/>
+                        <a:tabLst/>
+                        <a:defRPr/>
+                      </a:pPr>
+                      <a:r>
+                        <a:rPr lang="es-ES" sz="1800" dirty="0">
+                          <a:effectLst/>
+                        </a:rPr>
+                        <a:t>0.945</a:t>
+                      </a:r>
+                      <a:endParaRPr lang="es-CO" sz="1800" dirty="0">
+                        <a:effectLst/>
+                        <a:latin typeface="Calibri" panose="020F0502020204030204" pitchFamily="34" charset="0"/>
+                        <a:ea typeface="Calibri" panose="020F0502020204030204" pitchFamily="34" charset="0"/>
+                        <a:cs typeface="Times New Roman" panose="02020603050405020304" pitchFamily="18" charset="0"/>
+                      </a:endParaRPr>
+                    </a:p>
+                  </a:txBody>
+                  <a:tcPr/>
+                </a:tc>
+                <a:extLst>
+                  <a:ext uri="{0D108BD9-81ED-4DB2-BD59-A6C34878D82A}">
+                    <a16:rowId xmlns:a16="http://schemas.microsoft.com/office/drawing/2014/main" val="2326679667"/>
+                  </a:ext>
+                </a:extLst>
+              </a:tr>
+              <a:tr h="360000">
+                <a:tc>
+                  <a:txBody>
+                    <a:bodyPr/>
+                    <a:lstStyle/>
+                    <a:p>
+                      <a:pPr marL="0" marR="0" lvl="0" indent="0" algn="l" defTabSz="914400" rtl="0" eaLnBrk="1" fontAlgn="auto" latinLnBrk="0" hangingPunct="1">
+                        <a:lnSpc>
+                          <a:spcPct val="100000"/>
+                        </a:lnSpc>
+                        <a:spcBef>
+                          <a:spcPts val="0"/>
+                        </a:spcBef>
+                        <a:spcAft>
+                          <a:spcPts val="0"/>
+                        </a:spcAft>
+                        <a:buClrTx/>
+                        <a:buSzTx/>
+                        <a:buFontTx/>
+                        <a:buNone/>
+                        <a:tabLst/>
+                        <a:defRPr/>
+                      </a:pPr>
+                      <a:r>
+                        <a:rPr lang="es-ES" sz="1800" dirty="0">
+                          <a:effectLst/>
+                        </a:rPr>
+                        <a:t>AUC</a:t>
+                      </a:r>
+                      <a:endParaRPr lang="es-CO" sz="1800" dirty="0">
+                        <a:effectLst/>
+                        <a:latin typeface="Calibri" panose="020F0502020204030204" pitchFamily="34" charset="0"/>
+                        <a:ea typeface="Calibri" panose="020F0502020204030204" pitchFamily="34" charset="0"/>
+                        <a:cs typeface="Times New Roman" panose="02020603050405020304" pitchFamily="18" charset="0"/>
+                      </a:endParaRPr>
+                    </a:p>
+                  </a:txBody>
+                  <a:tcPr/>
+                </a:tc>
+                <a:tc>
+                  <a:txBody>
+                    <a:bodyPr/>
+                    <a:lstStyle/>
+                    <a:p>
+                      <a:pPr marL="0" marR="0" lvl="0" indent="0" algn="l" defTabSz="914400" rtl="0" eaLnBrk="1" fontAlgn="auto" latinLnBrk="0" hangingPunct="1">
+                        <a:lnSpc>
+                          <a:spcPct val="100000"/>
+                        </a:lnSpc>
+                        <a:spcBef>
+                          <a:spcPts val="0"/>
+                        </a:spcBef>
+                        <a:spcAft>
+                          <a:spcPts val="0"/>
+                        </a:spcAft>
+                        <a:buClrTx/>
+                        <a:buSzTx/>
+                        <a:buFontTx/>
+                        <a:buNone/>
+                        <a:tabLst/>
+                        <a:defRPr/>
+                      </a:pPr>
+                      <a:r>
+                        <a:rPr lang="es-ES" sz="1800" dirty="0">
+                          <a:effectLst/>
+                        </a:rPr>
+                        <a:t>0.972</a:t>
+                      </a:r>
+                      <a:endParaRPr lang="es-CO" sz="1800" dirty="0">
+                        <a:effectLst/>
+                        <a:latin typeface="Calibri" panose="020F0502020204030204" pitchFamily="34" charset="0"/>
+                        <a:ea typeface="Calibri" panose="020F0502020204030204" pitchFamily="34" charset="0"/>
+                        <a:cs typeface="Times New Roman" panose="02020603050405020304" pitchFamily="18" charset="0"/>
+                      </a:endParaRPr>
+                    </a:p>
+                  </a:txBody>
+                  <a:tcPr/>
+                </a:tc>
+                <a:extLst>
+                  <a:ext uri="{0D108BD9-81ED-4DB2-BD59-A6C34878D82A}">
+                    <a16:rowId xmlns:a16="http://schemas.microsoft.com/office/drawing/2014/main" val="1646438665"/>
+                  </a:ext>
+                </a:extLst>
+              </a:tr>
+              <a:tr h="360000">
+                <a:tc>
+                  <a:txBody>
+                    <a:bodyPr/>
+                    <a:lstStyle/>
+                    <a:p>
+                      <a:pPr marL="0" marR="0" lvl="0" indent="0" algn="l" defTabSz="914400" rtl="0" eaLnBrk="1" fontAlgn="auto" latinLnBrk="0" hangingPunct="1">
+                        <a:lnSpc>
+                          <a:spcPct val="100000"/>
+                        </a:lnSpc>
+                        <a:spcBef>
+                          <a:spcPts val="0"/>
+                        </a:spcBef>
+                        <a:spcAft>
+                          <a:spcPts val="0"/>
+                        </a:spcAft>
+                        <a:buClrTx/>
+                        <a:buSzTx/>
+                        <a:buFontTx/>
+                        <a:buNone/>
+                        <a:tabLst/>
+                        <a:defRPr/>
+                      </a:pPr>
+                      <a:r>
+                        <a:rPr lang="es-ES" sz="1800" dirty="0">
+                          <a:effectLst/>
+                        </a:rPr>
+                        <a:t>Especificidad</a:t>
+                      </a:r>
+                    </a:p>
+                  </a:txBody>
+                  <a:tcPr/>
+                </a:tc>
+                <a:tc>
+                  <a:txBody>
+                    <a:bodyPr/>
+                    <a:lstStyle/>
+                    <a:p>
+                      <a:pPr marL="0" marR="0" lvl="0" indent="0" algn="l" defTabSz="914400" rtl="0" eaLnBrk="1" fontAlgn="auto" latinLnBrk="0" hangingPunct="1">
+                        <a:lnSpc>
+                          <a:spcPct val="100000"/>
+                        </a:lnSpc>
+                        <a:spcBef>
+                          <a:spcPts val="0"/>
+                        </a:spcBef>
+                        <a:spcAft>
+                          <a:spcPts val="0"/>
+                        </a:spcAft>
+                        <a:buClrTx/>
+                        <a:buSzTx/>
+                        <a:buFontTx/>
+                        <a:buNone/>
+                        <a:tabLst/>
+                        <a:defRPr/>
+                      </a:pPr>
+                      <a:r>
+                        <a:rPr lang="es-ES" sz="1800" dirty="0">
+                          <a:effectLst/>
+                        </a:rPr>
+                        <a:t>0.972</a:t>
+                      </a:r>
+                    </a:p>
+                  </a:txBody>
+                  <a:tcPr/>
+                </a:tc>
+                <a:extLst>
+                  <a:ext uri="{0D108BD9-81ED-4DB2-BD59-A6C34878D82A}">
+                    <a16:rowId xmlns:a16="http://schemas.microsoft.com/office/drawing/2014/main" val="3621784082"/>
+                  </a:ext>
+                </a:extLst>
+              </a:tr>
+            </a:tbl>
+          </a:graphicData>
+        </a:graphic>
+      </p:graphicFrame>
     </p:spTree>
     <p:extLst>
       <p:ext uri="{BB962C8B-B14F-4D97-AF65-F5344CB8AC3E}">
@@ -14324,8 +14649,8 @@
         </p:blipFill>
         <p:spPr>
           <a:xfrm>
-            <a:off x="947441" y="2457137"/>
-            <a:ext cx="3894429" cy="3567647"/>
+            <a:off x="1411267" y="2183578"/>
+            <a:ext cx="4684733" cy="4291636"/>
           </a:xfrm>
           <a:prstGeom prst="rect">
             <a:avLst/>
@@ -14334,10 +14659,10 @@
       </p:pic>
       <p:graphicFrame>
         <p:nvGraphicFramePr>
-          <p:cNvPr id="2" name="Table 1">
-            <a:extLst>
-              <a:ext uri="{FF2B5EF4-FFF2-40B4-BE49-F238E27FC236}">
-                <a16:creationId xmlns:a16="http://schemas.microsoft.com/office/drawing/2014/main" id="{15A8EF43-1770-49D9-ADB2-FE910855CAB8}"/>
+          <p:cNvPr id="10" name="Table 2">
+            <a:extLst>
+              <a:ext uri="{FF2B5EF4-FFF2-40B4-BE49-F238E27FC236}">
+                <a16:creationId xmlns:a16="http://schemas.microsoft.com/office/drawing/2014/main" id="{8646972F-7CA2-4664-BFFD-DEE425B29BA0}"/>
               </a:ext>
             </a:extLst>
           </p:cNvPr>
@@ -14347,83 +14672,67 @@
           <p:nvPr>
             <p:extLst>
               <p:ext uri="{D42A27DB-BD31-4B8C-83A1-F6EECF244321}">
-                <p14:modId xmlns:p14="http://schemas.microsoft.com/office/powerpoint/2010/main" val="50920647"/>
+                <p14:modId xmlns:p14="http://schemas.microsoft.com/office/powerpoint/2010/main" val="3491699414"/>
               </p:ext>
             </p:extLst>
           </p:nvPr>
         </p:nvGraphicFramePr>
         <p:xfrm>
-          <a:off x="5351801" y="3784570"/>
-          <a:ext cx="5892758" cy="365760"/>
+          <a:off x="7210700" y="2870170"/>
+          <a:ext cx="3256999" cy="2194560"/>
         </p:xfrm>
         <a:graphic>
           <a:graphicData uri="http://schemas.openxmlformats.org/drawingml/2006/table">
             <a:tbl>
-              <a:tblPr firstRow="1" firstCol="1" bandRow="1">
-                <a:tableStyleId>{5202B0CA-FC54-4496-8BCA-5EF66A818D29}</a:tableStyleId>
+              <a:tblPr firstRow="1" bandRow="1">
+                <a:tableStyleId>{5C22544A-7EE6-4342-B048-85BDC9FD1C3A}</a:tableStyleId>
               </a:tblPr>
               <a:tblGrid>
-                <a:gridCol w="1021656">
+                <a:gridCol w="1689653">
                   <a:extLst>
                     <a:ext uri="{9D8B030D-6E8A-4147-A177-3AD203B41FA5}">
-                      <a16:colId xmlns:a16="http://schemas.microsoft.com/office/drawing/2014/main" val="777521470"/>
+                      <a16:colId xmlns:a16="http://schemas.microsoft.com/office/drawing/2014/main" val="2300131777"/>
                     </a:ext>
                   </a:extLst>
                 </a:gridCol>
-                <a:gridCol w="895409">
+                <a:gridCol w="1567346">
                   <a:extLst>
                     <a:ext uri="{9D8B030D-6E8A-4147-A177-3AD203B41FA5}">
-                      <a16:colId xmlns:a16="http://schemas.microsoft.com/office/drawing/2014/main" val="2784390591"/>
-                    </a:ext>
-                  </a:extLst>
-                </a:gridCol>
-                <a:gridCol w="836295">
-                  <a:extLst>
-                    <a:ext uri="{9D8B030D-6E8A-4147-A177-3AD203B41FA5}">
-                      <a16:colId xmlns:a16="http://schemas.microsoft.com/office/drawing/2014/main" val="2139767697"/>
-                    </a:ext>
-                  </a:extLst>
-                </a:gridCol>
-                <a:gridCol w="922020">
-                  <a:extLst>
-                    <a:ext uri="{9D8B030D-6E8A-4147-A177-3AD203B41FA5}">
-                      <a16:colId xmlns:a16="http://schemas.microsoft.com/office/drawing/2014/main" val="3153343522"/>
-                    </a:ext>
-                  </a:extLst>
-                </a:gridCol>
-                <a:gridCol w="1022350">
-                  <a:extLst>
-                    <a:ext uri="{9D8B030D-6E8A-4147-A177-3AD203B41FA5}">
-                      <a16:colId xmlns:a16="http://schemas.microsoft.com/office/drawing/2014/main" val="3819053183"/>
-                    </a:ext>
-                  </a:extLst>
-                </a:gridCol>
-                <a:gridCol w="1195028">
-                  <a:extLst>
-                    <a:ext uri="{9D8B030D-6E8A-4147-A177-3AD203B41FA5}">
-                      <a16:colId xmlns:a16="http://schemas.microsoft.com/office/drawing/2014/main" val="2148475599"/>
+                      <a16:colId xmlns:a16="http://schemas.microsoft.com/office/drawing/2014/main" val="1477300347"/>
                     </a:ext>
                   </a:extLst>
                 </a:gridCol>
               </a:tblGrid>
-              <a:tr h="0">
+              <a:tr h="360000">
                 <a:tc>
                   <a:txBody>
                     <a:bodyPr/>
                     <a:lstStyle/>
                     <a:p>
-                      <a:pPr algn="ctr">
+                      <a:pPr marL="0" marR="0" lvl="0" indent="0" algn="l" defTabSz="914400" rtl="0" eaLnBrk="1" fontAlgn="auto" latinLnBrk="0" hangingPunct="1">
+                        <a:lnSpc>
+                          <a:spcPct val="100000"/>
+                        </a:lnSpc>
                         <a:spcBef>
-                          <a:spcPts val="600"/>
+                          <a:spcPts val="0"/>
                         </a:spcBef>
+                        <a:spcAft>
+                          <a:spcPts val="0"/>
+                        </a:spcAft>
+                        <a:buClrTx/>
+                        <a:buSzTx/>
+                        <a:buFontTx/>
+                        <a:buNone/>
+                        <a:tabLst/>
+                        <a:defRPr/>
                       </a:pPr>
                       <a:r>
-                        <a:rPr lang="es-ES" sz="1200">
+                        <a:rPr lang="es-ES" sz="1800" dirty="0">
                           <a:effectLst/>
                         </a:rPr>
                         <a:t>Sensibilidad</a:t>
                       </a:r>
-                      <a:endParaRPr lang="es-CO" sz="1200">
+                      <a:endParaRPr lang="es-CO" sz="1800" dirty="0">
                         <a:effectLst/>
                         <a:latin typeface="Calibri" panose="020F0502020204030204" pitchFamily="34" charset="0"/>
                         <a:ea typeface="Calibri" panose="020F0502020204030204" pitchFamily="34" charset="0"/>
@@ -14431,25 +14740,82 @@
                       </a:endParaRPr>
                     </a:p>
                   </a:txBody>
-                  <a:tcPr marL="68580" marR="68580" marT="0" marB="0"/>
+                  <a:tcPr/>
                 </a:tc>
                 <a:tc>
                   <a:txBody>
                     <a:bodyPr/>
                     <a:lstStyle/>
                     <a:p>
-                      <a:pPr algn="ctr">
+                      <a:pPr marL="0" marR="0" lvl="0" indent="0" algn="l" defTabSz="914400" rtl="0" eaLnBrk="1" fontAlgn="auto" latinLnBrk="0" hangingPunct="1">
+                        <a:lnSpc>
+                          <a:spcPct val="100000"/>
+                        </a:lnSpc>
                         <a:spcBef>
-                          <a:spcPts val="600"/>
+                          <a:spcPts val="0"/>
                         </a:spcBef>
+                        <a:spcAft>
+                          <a:spcPts val="0"/>
+                        </a:spcAft>
+                        <a:buClrTx/>
+                        <a:buSzTx/>
+                        <a:buFontTx/>
+                        <a:buNone/>
+                        <a:tabLst/>
+                        <a:defRPr/>
                       </a:pPr>
                       <a:r>
-                        <a:rPr lang="es-ES" sz="1200">
+                        <a:rPr lang="es-ES" sz="1800" b="0" dirty="0">
+                          <a:effectLst/>
+                        </a:rPr>
+                        <a:t>0.892</a:t>
+                      </a:r>
+                      <a:endParaRPr lang="es-CO" sz="1800" b="0" dirty="0">
+                        <a:effectLst/>
+                        <a:latin typeface="Calibri" panose="020F0502020204030204" pitchFamily="34" charset="0"/>
+                        <a:ea typeface="+mn-ea"/>
+                        <a:cs typeface="Times New Roman" panose="02020603050405020304" pitchFamily="18" charset="0"/>
+                      </a:endParaRPr>
+                    </a:p>
+                  </a:txBody>
+                  <a:tcPr/>
+                </a:tc>
+                <a:extLst>
+                  <a:ext uri="{0D108BD9-81ED-4DB2-BD59-A6C34878D82A}">
+                    <a16:rowId xmlns:a16="http://schemas.microsoft.com/office/drawing/2014/main" val="750535927"/>
+                  </a:ext>
+                </a:extLst>
+              </a:tr>
+              <a:tr h="360000">
+                <a:tc>
+                  <a:txBody>
+                    <a:bodyPr/>
+                    <a:lstStyle/>
+                    <a:p>
+                      <a:pPr marL="0" marR="0" lvl="0" indent="0" algn="l" defTabSz="914400" rtl="0" eaLnBrk="1" fontAlgn="auto" latinLnBrk="0" hangingPunct="1">
+                        <a:lnSpc>
+                          <a:spcPct val="100000"/>
+                        </a:lnSpc>
+                        <a:spcBef>
+                          <a:spcPts val="0"/>
+                        </a:spcBef>
+                        <a:spcAft>
+                          <a:spcPts val="0"/>
+                        </a:spcAft>
+                        <a:buClrTx/>
+                        <a:buSzTx/>
+                        <a:buFontTx/>
+                        <a:buNone/>
+                        <a:tabLst/>
+                        <a:defRPr/>
+                      </a:pPr>
+                      <a:r>
+                        <a:rPr lang="es-ES" sz="1800" dirty="0">
                           <a:effectLst/>
                         </a:rPr>
                         <a:t>Precisión</a:t>
                       </a:r>
-                      <a:endParaRPr lang="es-CO" sz="1200">
+                      <a:endParaRPr lang="es-CO" sz="1800" dirty="0">
                         <a:effectLst/>
                         <a:latin typeface="Calibri" panose="020F0502020204030204" pitchFamily="34" charset="0"/>
                         <a:ea typeface="Calibri" panose="020F0502020204030204" pitchFamily="34" charset="0"/>
@@ -14457,25 +14823,37 @@
                       </a:endParaRPr>
                     </a:p>
                   </a:txBody>
-                  <a:tcPr marL="68580" marR="68580" marT="0" marB="0"/>
+                  <a:tcPr/>
                 </a:tc>
                 <a:tc>
                   <a:txBody>
                     <a:bodyPr/>
                     <a:lstStyle/>
                     <a:p>
-                      <a:pPr algn="ctr">
+                      <a:pPr marL="0" marR="0" lvl="0" indent="0" algn="l" defTabSz="914400" rtl="0" eaLnBrk="1" fontAlgn="auto" latinLnBrk="0" hangingPunct="1">
+                        <a:lnSpc>
+                          <a:spcPct val="100000"/>
+                        </a:lnSpc>
                         <a:spcBef>
-                          <a:spcPts val="600"/>
+                          <a:spcPts val="0"/>
                         </a:spcBef>
+                        <a:spcAft>
+                          <a:spcPts val="0"/>
+                        </a:spcAft>
+                        <a:buClrTx/>
+                        <a:buSzTx/>
+                        <a:buFontTx/>
+                        <a:buNone/>
+                        <a:tabLst/>
+                        <a:defRPr/>
                       </a:pPr>
                       <a:r>
-                        <a:rPr lang="es-ES" sz="1200" dirty="0">
+                        <a:rPr lang="es-ES" sz="1800" dirty="0">
                           <a:effectLst/>
                         </a:rPr>
-                        <a:t>F1</a:t>
+                        <a:t>0.895</a:t>
                       </a:r>
-                      <a:endParaRPr lang="es-CO" sz="1200" dirty="0">
+                      <a:endParaRPr lang="es-CO" sz="1800" dirty="0">
                         <a:effectLst/>
                         <a:latin typeface="Calibri" panose="020F0502020204030204" pitchFamily="34" charset="0"/>
                         <a:ea typeface="Calibri" panose="020F0502020204030204" pitchFamily="34" charset="0"/>
@@ -14483,25 +14861,44 @@
                       </a:endParaRPr>
                     </a:p>
                   </a:txBody>
-                  <a:tcPr marL="68580" marR="68580" marT="0" marB="0"/>
+                  <a:tcPr/>
                 </a:tc>
+                <a:extLst>
+                  <a:ext uri="{0D108BD9-81ED-4DB2-BD59-A6C34878D82A}">
+                    <a16:rowId xmlns:a16="http://schemas.microsoft.com/office/drawing/2014/main" val="556949355"/>
+                  </a:ext>
+                </a:extLst>
+              </a:tr>
+              <a:tr h="360000">
                 <a:tc>
                   <a:txBody>
                     <a:bodyPr/>
                     <a:lstStyle/>
                     <a:p>
-                      <a:pPr algn="ctr">
+                      <a:pPr marL="0" marR="0" lvl="0" indent="0" algn="l" defTabSz="914400" rtl="0" eaLnBrk="1" fontAlgn="auto" latinLnBrk="0" hangingPunct="1">
+                        <a:lnSpc>
+                          <a:spcPct val="100000"/>
+                        </a:lnSpc>
                         <a:spcBef>
-                          <a:spcPts val="600"/>
+                          <a:spcPts val="0"/>
                         </a:spcBef>
+                        <a:spcAft>
+                          <a:spcPts val="0"/>
+                        </a:spcAft>
+                        <a:buClrTx/>
+                        <a:buSzTx/>
+                        <a:buFontTx/>
+                        <a:buNone/>
+                        <a:tabLst/>
+                        <a:defRPr/>
                       </a:pPr>
                       <a:r>
-                        <a:rPr lang="es-ES" sz="1200">
+                        <a:rPr lang="es-ES" sz="1800" dirty="0">
                           <a:effectLst/>
                         </a:rPr>
-                        <a:t>Exactitud</a:t>
+                        <a:t>F1</a:t>
                       </a:r>
-                      <a:endParaRPr lang="es-CO" sz="1200">
+                      <a:endParaRPr lang="es-CO" sz="1800" dirty="0">
                         <a:effectLst/>
                         <a:latin typeface="Calibri" panose="020F0502020204030204" pitchFamily="34" charset="0"/>
                         <a:ea typeface="Calibri" panose="020F0502020204030204" pitchFamily="34" charset="0"/>
@@ -14509,25 +14906,37 @@
                       </a:endParaRPr>
                     </a:p>
                   </a:txBody>
-                  <a:tcPr marL="68580" marR="68580" marT="0" marB="0"/>
+                  <a:tcPr/>
                 </a:tc>
                 <a:tc>
                   <a:txBody>
                     <a:bodyPr/>
                     <a:lstStyle/>
                     <a:p>
-                      <a:pPr algn="ctr">
+                      <a:pPr marL="0" marR="0" lvl="0" indent="0" algn="l" defTabSz="914400" rtl="0" eaLnBrk="1" fontAlgn="auto" latinLnBrk="0" hangingPunct="1">
+                        <a:lnSpc>
+                          <a:spcPct val="100000"/>
+                        </a:lnSpc>
                         <a:spcBef>
-                          <a:spcPts val="600"/>
+                          <a:spcPts val="0"/>
                         </a:spcBef>
+                        <a:spcAft>
+                          <a:spcPts val="0"/>
+                        </a:spcAft>
+                        <a:buClrTx/>
+                        <a:buSzTx/>
+                        <a:buFontTx/>
+                        <a:buNone/>
+                        <a:tabLst/>
+                        <a:defRPr/>
                       </a:pPr>
                       <a:r>
-                        <a:rPr lang="es-ES" sz="1200">
+                        <a:rPr lang="es-ES" sz="1800" dirty="0">
                           <a:effectLst/>
                         </a:rPr>
-                        <a:t>AUC</a:t>
+                        <a:t>0.891</a:t>
                       </a:r>
-                      <a:endParaRPr lang="es-CO" sz="1200">
+                      <a:endParaRPr lang="es-CO" sz="1800" dirty="0">
                         <a:effectLst/>
                         <a:latin typeface="Calibri" panose="020F0502020204030204" pitchFamily="34" charset="0"/>
                         <a:ea typeface="Calibri" panose="020F0502020204030204" pitchFamily="34" charset="0"/>
@@ -14535,25 +14944,44 @@
                       </a:endParaRPr>
                     </a:p>
                   </a:txBody>
-                  <a:tcPr marL="68580" marR="68580" marT="0" marB="0"/>
+                  <a:tcPr/>
                 </a:tc>
+                <a:extLst>
+                  <a:ext uri="{0D108BD9-81ED-4DB2-BD59-A6C34878D82A}">
+                    <a16:rowId xmlns:a16="http://schemas.microsoft.com/office/drawing/2014/main" val="560068297"/>
+                  </a:ext>
+                </a:extLst>
+              </a:tr>
+              <a:tr h="360000">
                 <a:tc>
                   <a:txBody>
                     <a:bodyPr/>
                     <a:lstStyle/>
                     <a:p>
-                      <a:pPr algn="ctr">
+                      <a:pPr marL="0" marR="0" lvl="0" indent="0" algn="l" defTabSz="914400" rtl="0" eaLnBrk="1" fontAlgn="auto" latinLnBrk="0" hangingPunct="1">
+                        <a:lnSpc>
+                          <a:spcPct val="100000"/>
+                        </a:lnSpc>
                         <a:spcBef>
-                          <a:spcPts val="600"/>
+                          <a:spcPts val="0"/>
                         </a:spcBef>
+                        <a:spcAft>
+                          <a:spcPts val="0"/>
+                        </a:spcAft>
+                        <a:buClrTx/>
+                        <a:buSzTx/>
+                        <a:buFontTx/>
+                        <a:buNone/>
+                        <a:tabLst/>
+                        <a:defRPr/>
                       </a:pPr>
                       <a:r>
-                        <a:rPr lang="es-ES" sz="1200">
+                        <a:rPr lang="es-ES" sz="1800" dirty="0">
                           <a:effectLst/>
                         </a:rPr>
-                        <a:t>Especificidad</a:t>
+                        <a:t>Exactitud</a:t>
                       </a:r>
-                      <a:endParaRPr lang="es-CO" sz="1200">
+                      <a:endParaRPr lang="es-CO" sz="1800" dirty="0">
                         <a:effectLst/>
                         <a:latin typeface="Calibri" panose="020F0502020204030204" pitchFamily="34" charset="0"/>
                         <a:ea typeface="Calibri" panose="020F0502020204030204" pitchFamily="34" charset="0"/>
@@ -14561,32 +14989,37 @@
                       </a:endParaRPr>
                     </a:p>
                   </a:txBody>
-                  <a:tcPr marL="68580" marR="68580" marT="0" marB="0"/>
+                  <a:tcPr/>
                 </a:tc>
-                <a:extLst>
-                  <a:ext uri="{0D108BD9-81ED-4DB2-BD59-A6C34878D82A}">
-                    <a16:rowId xmlns:a16="http://schemas.microsoft.com/office/drawing/2014/main" val="1195579516"/>
-                  </a:ext>
-                </a:extLst>
-              </a:tr>
-              <a:tr h="0">
                 <a:tc>
                   <a:txBody>
                     <a:bodyPr/>
                     <a:lstStyle/>
                     <a:p>
-                      <a:pPr algn="ctr">
+                      <a:pPr marL="0" marR="0" lvl="0" indent="0" algn="l" defTabSz="914400" rtl="0" eaLnBrk="1" fontAlgn="auto" latinLnBrk="0" hangingPunct="1">
+                        <a:lnSpc>
+                          <a:spcPct val="100000"/>
+                        </a:lnSpc>
                         <a:spcBef>
-                          <a:spcPts val="600"/>
+                          <a:spcPts val="0"/>
                         </a:spcBef>
+                        <a:spcAft>
+                          <a:spcPts val="0"/>
+                        </a:spcAft>
+                        <a:buClrTx/>
+                        <a:buSzTx/>
+                        <a:buFontTx/>
+                        <a:buNone/>
+                        <a:tabLst/>
+                        <a:defRPr/>
                       </a:pPr>
                       <a:r>
-                        <a:rPr lang="es-ES" sz="1200" b="0" dirty="0">
+                        <a:rPr lang="es-ES" sz="1800" dirty="0">
                           <a:effectLst/>
                         </a:rPr>
                         <a:t>0.892</a:t>
                       </a:r>
-                      <a:endParaRPr lang="es-CO" sz="1200" b="0" dirty="0">
+                      <a:endParaRPr lang="es-CO" sz="1800" dirty="0">
                         <a:effectLst/>
                         <a:latin typeface="Calibri" panose="020F0502020204030204" pitchFamily="34" charset="0"/>
                         <a:ea typeface="Calibri" panose="020F0502020204030204" pitchFamily="34" charset="0"/>
@@ -14594,25 +15027,44 @@
                       </a:endParaRPr>
                     </a:p>
                   </a:txBody>
-                  <a:tcPr marL="68580" marR="68580" marT="0" marB="0"/>
+                  <a:tcPr/>
                 </a:tc>
+                <a:extLst>
+                  <a:ext uri="{0D108BD9-81ED-4DB2-BD59-A6C34878D82A}">
+                    <a16:rowId xmlns:a16="http://schemas.microsoft.com/office/drawing/2014/main" val="2326679667"/>
+                  </a:ext>
+                </a:extLst>
+              </a:tr>
+              <a:tr h="360000">
                 <a:tc>
                   <a:txBody>
                     <a:bodyPr/>
                     <a:lstStyle/>
                     <a:p>
-                      <a:pPr algn="ctr">
+                      <a:pPr marL="0" marR="0" lvl="0" indent="0" algn="l" defTabSz="914400" rtl="0" eaLnBrk="1" fontAlgn="auto" latinLnBrk="0" hangingPunct="1">
+                        <a:lnSpc>
+                          <a:spcPct val="100000"/>
+                        </a:lnSpc>
                         <a:spcBef>
-                          <a:spcPts val="600"/>
+                          <a:spcPts val="0"/>
                         </a:spcBef>
+                        <a:spcAft>
+                          <a:spcPts val="0"/>
+                        </a:spcAft>
+                        <a:buClrTx/>
+                        <a:buSzTx/>
+                        <a:buFontTx/>
+                        <a:buNone/>
+                        <a:tabLst/>
+                        <a:defRPr/>
                       </a:pPr>
                       <a:r>
-                        <a:rPr lang="es-ES" sz="1200">
+                        <a:rPr lang="es-ES" sz="1800" dirty="0">
                           <a:effectLst/>
                         </a:rPr>
-                        <a:t>0.895</a:t>
+                        <a:t>AUC</a:t>
                       </a:r>
-                      <a:endParaRPr lang="es-CO" sz="1200">
+                      <a:endParaRPr lang="es-CO" sz="1800" dirty="0">
                         <a:effectLst/>
                         <a:latin typeface="Calibri" panose="020F0502020204030204" pitchFamily="34" charset="0"/>
                         <a:ea typeface="Calibri" panose="020F0502020204030204" pitchFamily="34" charset="0"/>
@@ -14620,25 +15072,37 @@
                       </a:endParaRPr>
                     </a:p>
                   </a:txBody>
-                  <a:tcPr marL="68580" marR="68580" marT="0" marB="0"/>
+                  <a:tcPr/>
                 </a:tc>
                 <a:tc>
                   <a:txBody>
                     <a:bodyPr/>
                     <a:lstStyle/>
                     <a:p>
-                      <a:pPr algn="ctr">
+                      <a:pPr marL="0" marR="0" lvl="0" indent="0" algn="l" defTabSz="914400" rtl="0" eaLnBrk="1" fontAlgn="auto" latinLnBrk="0" hangingPunct="1">
+                        <a:lnSpc>
+                          <a:spcPct val="100000"/>
+                        </a:lnSpc>
                         <a:spcBef>
-                          <a:spcPts val="600"/>
+                          <a:spcPts val="0"/>
                         </a:spcBef>
+                        <a:spcAft>
+                          <a:spcPts val="0"/>
+                        </a:spcAft>
+                        <a:buClrTx/>
+                        <a:buSzTx/>
+                        <a:buFontTx/>
+                        <a:buNone/>
+                        <a:tabLst/>
+                        <a:defRPr/>
                       </a:pPr>
                       <a:r>
-                        <a:rPr lang="es-ES" sz="1200">
+                        <a:rPr lang="es-ES" sz="1800" dirty="0">
                           <a:effectLst/>
                         </a:rPr>
-                        <a:t>0.891</a:t>
+                        <a:t>0.980</a:t>
                       </a:r>
-                      <a:endParaRPr lang="es-CO" sz="1200">
+                      <a:endParaRPr lang="es-CO" sz="1800" dirty="0">
                         <a:effectLst/>
                         <a:latin typeface="Calibri" panose="020F0502020204030204" pitchFamily="34" charset="0"/>
                         <a:ea typeface="Calibri" panose="020F0502020204030204" pitchFamily="34" charset="0"/>
@@ -14646,89 +15110,82 @@
                       </a:endParaRPr>
                     </a:p>
                   </a:txBody>
-                  <a:tcPr marL="68580" marR="68580" marT="0" marB="0"/>
+                  <a:tcPr/>
+                </a:tc>
+                <a:extLst>
+                  <a:ext uri="{0D108BD9-81ED-4DB2-BD59-A6C34878D82A}">
+                    <a16:rowId xmlns:a16="http://schemas.microsoft.com/office/drawing/2014/main" val="1646438665"/>
+                  </a:ext>
+                </a:extLst>
+              </a:tr>
+              <a:tr h="360000">
+                <a:tc>
+                  <a:txBody>
+                    <a:bodyPr/>
+                    <a:lstStyle/>
+                    <a:p>
+                      <a:pPr marL="0" marR="0" lvl="0" indent="0" algn="l" defTabSz="914400" rtl="0" eaLnBrk="1" fontAlgn="auto" latinLnBrk="0" hangingPunct="1">
+                        <a:lnSpc>
+                          <a:spcPct val="100000"/>
+                        </a:lnSpc>
+                        <a:spcBef>
+                          <a:spcPts val="0"/>
+                        </a:spcBef>
+                        <a:spcAft>
+                          <a:spcPts val="0"/>
+                        </a:spcAft>
+                        <a:buClrTx/>
+                        <a:buSzTx/>
+                        <a:buFontTx/>
+                        <a:buNone/>
+                        <a:tabLst/>
+                        <a:defRPr/>
+                      </a:pPr>
+                      <a:r>
+                        <a:rPr lang="es-ES" sz="1800" dirty="0">
+                          <a:effectLst/>
+                        </a:rPr>
+                        <a:t>Especificidad</a:t>
+                      </a:r>
+                    </a:p>
+                  </a:txBody>
+                  <a:tcPr/>
                 </a:tc>
                 <a:tc>
                   <a:txBody>
                     <a:bodyPr/>
                     <a:lstStyle/>
                     <a:p>
-                      <a:pPr algn="ctr">
+                      <a:pPr marL="0" marR="0" lvl="0" indent="0" algn="l" defTabSz="914400" rtl="0" eaLnBrk="1" fontAlgn="auto" latinLnBrk="0" hangingPunct="1">
+                        <a:lnSpc>
+                          <a:spcPct val="100000"/>
+                        </a:lnSpc>
                         <a:spcBef>
-                          <a:spcPts val="600"/>
+                          <a:spcPts val="0"/>
                         </a:spcBef>
+                        <a:spcAft>
+                          <a:spcPts val="0"/>
+                        </a:spcAft>
+                        <a:buClrTx/>
+                        <a:buSzTx/>
+                        <a:buFontTx/>
+                        <a:buNone/>
+                        <a:tabLst/>
+                        <a:defRPr/>
                       </a:pPr>
                       <a:r>
-                        <a:rPr lang="es-ES" sz="1200">
-                          <a:effectLst/>
-                        </a:rPr>
-                        <a:t>0.892</a:t>
-                      </a:r>
-                      <a:endParaRPr lang="es-CO" sz="1200">
-                        <a:effectLst/>
-                        <a:latin typeface="Calibri" panose="020F0502020204030204" pitchFamily="34" charset="0"/>
-                        <a:ea typeface="Calibri" panose="020F0502020204030204" pitchFamily="34" charset="0"/>
-                        <a:cs typeface="Times New Roman" panose="02020603050405020304" pitchFamily="18" charset="0"/>
-                      </a:endParaRPr>
-                    </a:p>
-                  </a:txBody>
-                  <a:tcPr marL="68580" marR="68580" marT="0" marB="0"/>
-                </a:tc>
-                <a:tc>
-                  <a:txBody>
-                    <a:bodyPr/>
-                    <a:lstStyle/>
-                    <a:p>
-                      <a:pPr algn="ctr">
-                        <a:spcBef>
-                          <a:spcPts val="600"/>
-                        </a:spcBef>
-                      </a:pPr>
-                      <a:r>
-                        <a:rPr lang="es-ES" sz="1200">
-                          <a:effectLst/>
-                        </a:rPr>
-                        <a:t>0.980</a:t>
-                      </a:r>
-                      <a:endParaRPr lang="es-CO" sz="1200">
-                        <a:effectLst/>
-                        <a:latin typeface="Calibri" panose="020F0502020204030204" pitchFamily="34" charset="0"/>
-                        <a:ea typeface="Calibri" panose="020F0502020204030204" pitchFamily="34" charset="0"/>
-                        <a:cs typeface="Times New Roman" panose="02020603050405020304" pitchFamily="18" charset="0"/>
-                      </a:endParaRPr>
-                    </a:p>
-                  </a:txBody>
-                  <a:tcPr marL="68580" marR="68580" marT="0" marB="0"/>
-                </a:tc>
-                <a:tc>
-                  <a:txBody>
-                    <a:bodyPr/>
-                    <a:lstStyle/>
-                    <a:p>
-                      <a:pPr algn="ctr">
-                        <a:spcBef>
-                          <a:spcPts val="600"/>
-                        </a:spcBef>
-                      </a:pPr>
-                      <a:r>
-                        <a:rPr lang="es-ES" sz="1200" dirty="0">
+                        <a:rPr lang="es-ES" sz="1800" dirty="0">
                           <a:effectLst/>
                         </a:rPr>
                         <a:t>0.946</a:t>
                       </a:r>
-                      <a:endParaRPr lang="es-CO" sz="1200" dirty="0">
-                        <a:effectLst/>
-                        <a:latin typeface="Calibri" panose="020F0502020204030204" pitchFamily="34" charset="0"/>
-                        <a:ea typeface="Calibri" panose="020F0502020204030204" pitchFamily="34" charset="0"/>
-                        <a:cs typeface="Times New Roman" panose="02020603050405020304" pitchFamily="18" charset="0"/>
-                      </a:endParaRPr>
                     </a:p>
                   </a:txBody>
-                  <a:tcPr marL="68580" marR="68580" marT="0" marB="0"/>
+                  <a:tcPr/>
                 </a:tc>
                 <a:extLst>
                   <a:ext uri="{0D108BD9-81ED-4DB2-BD59-A6C34878D82A}">
-                    <a16:rowId xmlns:a16="http://schemas.microsoft.com/office/drawing/2014/main" val="1880251709"/>
+                    <a16:rowId xmlns:a16="http://schemas.microsoft.com/office/drawing/2014/main" val="3621784082"/>
                   </a:ext>
                 </a:extLst>
               </a:tr>
@@ -15467,21 +15924,21 @@
 </file>
 
 <file path=customXml/item2.xml><?xml version="1.0" encoding="utf-8"?>
+<p:properties xmlns:p="http://schemas.microsoft.com/office/2006/metadata/properties" xmlns:xsi="http://www.w3.org/2001/XMLSchema-instance" xmlns:pc="http://schemas.microsoft.com/office/infopath/2007/PartnerControls">
+  <documentManagement>
+    <Status xmlns="71af3243-3dd4-4a8d-8c0d-dd76da1f02a5">Not started</Status>
+    <MediaServiceKeyPoints xmlns="71af3243-3dd4-4a8d-8c0d-dd76da1f02a5" xsi:nil="true"/>
+  </documentManagement>
+</p:properties>
+</file>
+
+<file path=customXml/item3.xml><?xml version="1.0" encoding="utf-8"?>
 <?mso-contentType ?>
 <FormTemplates xmlns="http://schemas.microsoft.com/sharepoint/v3/contenttype/forms">
   <Display>DocumentLibraryForm</Display>
   <Edit>DocumentLibraryForm</Edit>
   <New>DocumentLibraryForm</New>
 </FormTemplates>
-</file>
-
-<file path=customXml/item3.xml><?xml version="1.0" encoding="utf-8"?>
-<p:properties xmlns:p="http://schemas.microsoft.com/office/2006/metadata/properties" xmlns:xsi="http://www.w3.org/2001/XMLSchema-instance" xmlns:pc="http://schemas.microsoft.com/office/infopath/2007/PartnerControls">
-  <documentManagement>
-    <Status xmlns="71af3243-3dd4-4a8d-8c0d-dd76da1f02a5">Not started</Status>
-    <MediaServiceKeyPoints xmlns="71af3243-3dd4-4a8d-8c0d-dd76da1f02a5" xsi:nil="true"/>
-  </documentManagement>
-</p:properties>
 </file>
 
 <file path=customXml/itemProps1.xml><?xml version="1.0" encoding="utf-8"?>
@@ -15504,14 +15961,6 @@
 </file>
 
 <file path=customXml/itemProps2.xml><?xml version="1.0" encoding="utf-8"?>
-<ds:datastoreItem xmlns:ds="http://schemas.openxmlformats.org/officeDocument/2006/customXml" ds:itemID="{182F651C-E5DA-470F-A6A6-D70E9A5EBFB8}">
-  <ds:schemaRefs>
-    <ds:schemaRef ds:uri="http://schemas.microsoft.com/sharepoint/v3/contenttype/forms"/>
-  </ds:schemaRefs>
-</ds:datastoreItem>
-</file>
-
-<file path=customXml/itemProps3.xml><?xml version="1.0" encoding="utf-8"?>
 <ds:datastoreItem xmlns:ds="http://schemas.openxmlformats.org/officeDocument/2006/customXml" ds:itemID="{E24273A0-A4DF-47AA-BF1F-8758123399CE}">
   <ds:schemaRefs>
     <ds:schemaRef ds:uri="http://purl.org/dc/terms/"/>
@@ -15526,4 +15975,12 @@
     <ds:schemaRef ds:uri="http://purl.org/dc/elements/1.1/"/>
   </ds:schemaRefs>
 </ds:datastoreItem>
+</file>
+
+<file path=customXml/itemProps3.xml><?xml version="1.0" encoding="utf-8"?>
+<ds:datastoreItem xmlns:ds="http://schemas.openxmlformats.org/officeDocument/2006/customXml" ds:itemID="{182F651C-E5DA-470F-A6A6-D70E9A5EBFB8}">
+  <ds:schemaRefs>
+    <ds:schemaRef ds:uri="http://schemas.microsoft.com/sharepoint/v3/contenttype/forms"/>
+  </ds:schemaRefs>
+</ds:datastoreItem>
 </file>
</xml_diff>